<commit_message>
added code & slides for weeks 5 and 6
</commit_message>
<xml_diff>
--- a/slides/template.pptx
+++ b/slides/template.pptx
@@ -5,28 +5,18 @@
     <p:sldMasterId id="2147483648" r:id="rId1"/>
   </p:sldMasterIdLst>
   <p:notesMasterIdLst>
-    <p:notesMasterId r:id="rId18"/>
+    <p:notesMasterId r:id="rId8"/>
   </p:notesMasterIdLst>
   <p:handoutMasterIdLst>
-    <p:handoutMasterId r:id="rId19"/>
+    <p:handoutMasterId r:id="rId9"/>
   </p:handoutMasterIdLst>
   <p:sldIdLst>
     <p:sldId id="262" r:id="rId2"/>
-    <p:sldId id="268" r:id="rId3"/>
-    <p:sldId id="269" r:id="rId4"/>
-    <p:sldId id="270" r:id="rId5"/>
-    <p:sldId id="271" r:id="rId6"/>
-    <p:sldId id="272" r:id="rId7"/>
-    <p:sldId id="274" r:id="rId8"/>
-    <p:sldId id="275" r:id="rId9"/>
-    <p:sldId id="276" r:id="rId10"/>
-    <p:sldId id="277" r:id="rId11"/>
-    <p:sldId id="278" r:id="rId12"/>
-    <p:sldId id="279" r:id="rId13"/>
-    <p:sldId id="280" r:id="rId14"/>
-    <p:sldId id="265" r:id="rId15"/>
-    <p:sldId id="266" r:id="rId16"/>
-    <p:sldId id="267" r:id="rId17"/>
+    <p:sldId id="269" r:id="rId3"/>
+    <p:sldId id="270" r:id="rId4"/>
+    <p:sldId id="265" r:id="rId5"/>
+    <p:sldId id="266" r:id="rId6"/>
+    <p:sldId id="267" r:id="rId7"/>
   </p:sldIdLst>
   <p:sldSz cx="9144000" cy="6858000" type="screen4x3"/>
   <p:notesSz cx="6858000" cy="9144000"/>
@@ -211,7 +201,7 @@
             <a:fld id="{43DBBD18-6C88-F045-A73C-EAB7098132B3}" type="datetime1">
               <a:rPr lang="en-US" smtClean="0"/>
               <a:pPr/>
-              <a:t>10/4/10</a:t>
+              <a:t>11/2/10</a:t>
             </a:fld>
             <a:endParaRPr lang="en-US"/>
           </a:p>
@@ -374,7 +364,7 @@
             <a:fld id="{EAEF232E-3F8A-2D4B-A08F-882F821D32B7}" type="datetime1">
               <a:rPr lang="en-US" smtClean="0"/>
               <a:pPr/>
-              <a:t>10/4/10</a:t>
+              <a:t>11/2/10</a:t>
             </a:fld>
             <a:endParaRPr lang="en-US"/>
           </a:p>
@@ -3877,7 +3867,11 @@
           <a:p>
             <a:r>
               <a:rPr lang="en-US" dirty="0" smtClean="0"/>
-              <a:t>&gt; To talk about object-oriented programming concepts</a:t>
+              <a:t>&gt;</a:t>
+            </a:r>
+            <a:r>
+              <a:rPr lang="en-US" dirty="0" smtClean="0"/>
+              <a:t> Collaborative Presentation</a:t>
             </a:r>
           </a:p>
           <a:p>
@@ -3886,7 +3880,19 @@
           <a:p>
             <a:r>
               <a:rPr lang="en-US" dirty="0" smtClean="0"/>
-              <a:t>&gt; To write a program in Processing together</a:t>
+              <a:t>&gt;</a:t>
+            </a:r>
+            <a:r>
+              <a:rPr lang="en-US" dirty="0" smtClean="0"/>
+              <a:t> </a:t>
+            </a:r>
+            <a:r>
+              <a:rPr lang="en-US" dirty="0" err="1" smtClean="0"/>
+              <a:t>VisWeek</a:t>
+            </a:r>
+            <a:r>
+              <a:rPr lang="en-US" dirty="0" smtClean="0"/>
+              <a:t> overview + Behaviorism presentation</a:t>
             </a:r>
           </a:p>
           <a:p>
@@ -3895,7 +3901,11 @@
           <a:p>
             <a:r>
               <a:rPr lang="en-US" dirty="0" smtClean="0"/>
-              <a:t>&gt; To show you your second assignment</a:t>
+              <a:t>&gt;</a:t>
+            </a:r>
+            <a:r>
+              <a:rPr lang="en-US" dirty="0" smtClean="0"/>
+              <a:t> Talk about your final projects</a:t>
             </a:r>
           </a:p>
           <a:p>
@@ -3903,2167 +3913,6 @@
           </a:p>
           <a:p>
             <a:endParaRPr lang="en-US" dirty="0" smtClean="0"/>
-          </a:p>
-        </p:txBody>
-      </p:sp>
-    </p:spTree>
-  </p:cSld>
-  <p:clrMapOvr>
-    <a:masterClrMapping/>
-  </p:clrMapOvr>
-  <p:timing>
-    <p:tnLst>
-      <p:par>
-        <p:cTn id="1" dur="indefinite" restart="never" nodeType="tmRoot"/>
-      </p:par>
-    </p:tnLst>
-  </p:timing>
-</p:sld>
-</file>
-
-<file path=ppt/slides/slide10.xml><?xml version="1.0" encoding="utf-8"?>
-<p:sld xmlns:a="http://schemas.openxmlformats.org/drawingml/2006/main" xmlns:r="http://schemas.openxmlformats.org/officeDocument/2006/relationships" xmlns:mc="http://schemas.openxmlformats.org/markup-compatibility/2006" xmlns:mv="urn:schemas-microsoft-com:mac:vml" xmlns:p="http://schemas.openxmlformats.org/presentationml/2006/main" mc:Ignorable="mv" mc:PreserveAttributes="mv:*">
-  <p:cSld>
-    <p:spTree>
-      <p:nvGrpSpPr>
-        <p:cNvPr id="1" name=""/>
-        <p:cNvGrpSpPr/>
-        <p:nvPr/>
-      </p:nvGrpSpPr>
-      <p:grpSpPr>
-        <a:xfrm>
-          <a:off x="0" y="0"/>
-          <a:ext cx="0" cy="0"/>
-          <a:chOff x="0" y="0"/>
-          <a:chExt cx="0" cy="0"/>
-        </a:xfrm>
-      </p:grpSpPr>
-      <p:sp>
-        <p:nvSpPr>
-          <p:cNvPr id="2" name="Title 1"/>
-          <p:cNvSpPr>
-            <a:spLocks noGrp="1"/>
-          </p:cNvSpPr>
-          <p:nvPr>
-            <p:ph type="title"/>
-          </p:nvPr>
-        </p:nvSpPr>
-        <p:spPr/>
-        <p:txBody>
-          <a:bodyPr/>
-          <a:lstStyle/>
-          <a:p>
-            <a:r>
-              <a:rPr lang="en-US" dirty="0" smtClean="0"/>
-              <a:t>Inheritance</a:t>
-            </a:r>
-            <a:endParaRPr lang="en-US" dirty="0"/>
-          </a:p>
-        </p:txBody>
-      </p:sp>
-      <p:sp>
-        <p:nvSpPr>
-          <p:cNvPr id="3" name="Content Placeholder 2"/>
-          <p:cNvSpPr>
-            <a:spLocks noGrp="1"/>
-          </p:cNvSpPr>
-          <p:nvPr>
-            <p:ph idx="1"/>
-          </p:nvPr>
-        </p:nvSpPr>
-        <p:spPr/>
-        <p:txBody>
-          <a:bodyPr/>
-          <a:lstStyle/>
-          <a:p>
-            <a:r>
-              <a:rPr lang="en-US" dirty="0" smtClean="0"/>
-              <a:t>Inheritance is a powerful feature of object-oriented languages which makes it easy to re-use and extend existing code-- either from a library or that you have created yourself.</a:t>
-            </a:r>
-          </a:p>
-          <a:p>
-            <a:endParaRPr lang="en-US" dirty="0" smtClean="0"/>
-          </a:p>
-          <a:p>
-            <a:r>
-              <a:rPr lang="en-US" dirty="0" smtClean="0"/>
-              <a:t>For example, you might want to model birds for a scientific or artistic simulation of flocking behavior.</a:t>
-            </a:r>
-          </a:p>
-          <a:p>
-            <a:endParaRPr lang="en-US" dirty="0" smtClean="0"/>
-          </a:p>
-          <a:p>
-            <a:r>
-              <a:rPr lang="en-US" dirty="0" smtClean="0"/>
-              <a:t>Inheritance lets you first model a "superset" of general qualities that are shared amongst all kinds of birds, and then modify them as needed for particular individuals or subsets of those birds.</a:t>
-            </a:r>
-          </a:p>
-          <a:p>
-            <a:endParaRPr lang="en-US" dirty="0" smtClean="0"/>
-          </a:p>
-          <a:p>
-            <a:r>
-              <a:rPr lang="en-US" dirty="0" smtClean="0"/>
-              <a:t>The root of your inheritance model is called the </a:t>
-            </a:r>
-            <a:r>
-              <a:rPr lang="en-US" i="1" dirty="0" err="1" smtClean="0"/>
-              <a:t>superclass</a:t>
-            </a:r>
-            <a:r>
-              <a:rPr lang="en-US" i="1" dirty="0" smtClean="0"/>
-              <a:t> </a:t>
-            </a:r>
-            <a:r>
-              <a:rPr lang="en-US" dirty="0" smtClean="0"/>
-              <a:t>or the </a:t>
-            </a:r>
-            <a:r>
-              <a:rPr lang="en-US" i="1" dirty="0" smtClean="0"/>
-              <a:t>base</a:t>
-            </a:r>
-            <a:r>
-              <a:rPr lang="en-US" dirty="0" smtClean="0"/>
-              <a:t> class. </a:t>
-            </a:r>
-          </a:p>
-          <a:p>
-            <a:endParaRPr lang="en-US" dirty="0" smtClean="0"/>
-          </a:p>
-          <a:p>
-            <a:pPr marL="381000" indent="-381000">
-              <a:lnSpc>
-                <a:spcPct val="80000"/>
-              </a:lnSpc>
-            </a:pPr>
-            <a:r>
-              <a:rPr lang="en-US" dirty="0" smtClean="0"/>
-              <a:t>abstract public class Bird</a:t>
-            </a:r>
-          </a:p>
-          <a:p>
-            <a:pPr marL="381000" indent="-381000">
-              <a:lnSpc>
-                <a:spcPct val="80000"/>
-              </a:lnSpc>
-            </a:pPr>
-            <a:r>
-              <a:rPr lang="en-US" dirty="0" smtClean="0"/>
-              <a:t>{</a:t>
-            </a:r>
-          </a:p>
-          <a:p>
-            <a:pPr marL="381000" indent="-381000">
-              <a:lnSpc>
-                <a:spcPct val="80000"/>
-              </a:lnSpc>
-            </a:pPr>
-            <a:r>
-              <a:rPr lang="en-US" dirty="0" smtClean="0"/>
-              <a:t>	Point </a:t>
-            </a:r>
-            <a:r>
-              <a:rPr lang="en-US" dirty="0" err="1" smtClean="0"/>
-              <a:t>currentPosition</a:t>
-            </a:r>
-            <a:r>
-              <a:rPr lang="en-US" dirty="0" smtClean="0"/>
-              <a:t> = new Point(0,0);</a:t>
-            </a:r>
-          </a:p>
-          <a:p>
-            <a:pPr marL="381000" indent="-381000">
-              <a:lnSpc>
-                <a:spcPct val="80000"/>
-              </a:lnSpc>
-            </a:pPr>
-            <a:r>
-              <a:rPr lang="en-US" dirty="0" smtClean="0"/>
-              <a:t>	String </a:t>
-            </a:r>
-            <a:r>
-              <a:rPr lang="en-US" dirty="0" err="1" smtClean="0"/>
-              <a:t>typeOfBird</a:t>
-            </a:r>
-            <a:r>
-              <a:rPr lang="en-US" dirty="0" smtClean="0"/>
-              <a:t>;	</a:t>
-            </a:r>
-          </a:p>
-          <a:p>
-            <a:pPr marL="381000" indent="-381000">
-              <a:lnSpc>
-                <a:spcPct val="80000"/>
-              </a:lnSpc>
-            </a:pPr>
-            <a:r>
-              <a:rPr lang="en-US" dirty="0" smtClean="0"/>
-              <a:t>	public </a:t>
-            </a:r>
-            <a:r>
-              <a:rPr lang="en-US" dirty="0" err="1" smtClean="0"/>
-              <a:t>Bird(String</a:t>
-            </a:r>
-            <a:r>
-              <a:rPr lang="en-US" dirty="0" smtClean="0"/>
-              <a:t> </a:t>
-            </a:r>
-            <a:r>
-              <a:rPr lang="en-US" dirty="0" err="1" smtClean="0"/>
-              <a:t>typeOfBird</a:t>
-            </a:r>
-            <a:r>
-              <a:rPr lang="en-US" dirty="0" smtClean="0"/>
-              <a:t>) {</a:t>
-            </a:r>
-          </a:p>
-          <a:p>
-            <a:pPr marL="381000" indent="-381000">
-              <a:lnSpc>
-                <a:spcPct val="80000"/>
-              </a:lnSpc>
-            </a:pPr>
-            <a:r>
-              <a:rPr lang="en-US" dirty="0" smtClean="0"/>
-              <a:t>		 </a:t>
-            </a:r>
-            <a:r>
-              <a:rPr lang="en-US" dirty="0" err="1" smtClean="0"/>
-              <a:t>this.typeOfBird</a:t>
-            </a:r>
-            <a:r>
-              <a:rPr lang="en-US" dirty="0" smtClean="0"/>
-              <a:t> = </a:t>
-            </a:r>
-            <a:r>
-              <a:rPr lang="en-US" dirty="0" err="1" smtClean="0"/>
-              <a:t>typeOfBird</a:t>
-            </a:r>
-            <a:r>
-              <a:rPr lang="en-US" dirty="0" smtClean="0"/>
-              <a:t>;</a:t>
-            </a:r>
-          </a:p>
-          <a:p>
-            <a:pPr marL="381000" indent="-381000">
-              <a:lnSpc>
-                <a:spcPct val="80000"/>
-              </a:lnSpc>
-            </a:pPr>
-            <a:r>
-              <a:rPr lang="en-US" dirty="0" smtClean="0"/>
-              <a:t>	}</a:t>
-            </a:r>
-          </a:p>
-          <a:p>
-            <a:pPr marL="381000" indent="-381000">
-              <a:lnSpc>
-                <a:spcPct val="80000"/>
-              </a:lnSpc>
-            </a:pPr>
-            <a:r>
-              <a:rPr lang="en-US" dirty="0" smtClean="0"/>
-              <a:t>	abstract public void </a:t>
-            </a:r>
-            <a:r>
-              <a:rPr lang="en-US" dirty="0" err="1" smtClean="0"/>
-              <a:t>nextPosition</a:t>
-            </a:r>
-            <a:r>
-              <a:rPr lang="en-US" dirty="0" smtClean="0"/>
-              <a:t>();</a:t>
-            </a:r>
-          </a:p>
-          <a:p>
-            <a:pPr marL="381000" indent="-381000">
-              <a:lnSpc>
-                <a:spcPct val="80000"/>
-              </a:lnSpc>
-            </a:pPr>
-            <a:endParaRPr lang="en-US" dirty="0" smtClean="0"/>
-          </a:p>
-          <a:p>
-            <a:pPr marL="381000" indent="-381000">
-              <a:lnSpc>
-                <a:spcPct val="80000"/>
-              </a:lnSpc>
-            </a:pPr>
-            <a:r>
-              <a:rPr lang="en-US" dirty="0" smtClean="0"/>
-              <a:t>	public String </a:t>
-            </a:r>
-            <a:r>
-              <a:rPr lang="en-US" dirty="0" err="1" smtClean="0"/>
-              <a:t>toString</a:t>
-            </a:r>
-            <a:r>
-              <a:rPr lang="en-US" dirty="0" smtClean="0"/>
-              <a:t>() { return </a:t>
-            </a:r>
-            <a:r>
-              <a:rPr lang="en-US" dirty="0" err="1" smtClean="0"/>
-              <a:t>typeOfBird</a:t>
-            </a:r>
-            <a:r>
-              <a:rPr lang="en-US" dirty="0" smtClean="0"/>
-              <a:t> + ":" + </a:t>
-            </a:r>
-            <a:r>
-              <a:rPr lang="en-US" dirty="0" err="1" smtClean="0"/>
-              <a:t>currentPosition</a:t>
-            </a:r>
-            <a:r>
-              <a:rPr lang="en-US" dirty="0" smtClean="0"/>
-              <a:t>; }</a:t>
-            </a:r>
-          </a:p>
-          <a:p>
-            <a:pPr marL="381000" indent="-381000">
-              <a:lnSpc>
-                <a:spcPct val="80000"/>
-              </a:lnSpc>
-            </a:pPr>
-            <a:r>
-              <a:rPr lang="en-US" dirty="0" smtClean="0"/>
-              <a:t>}		</a:t>
-            </a:r>
-          </a:p>
-        </p:txBody>
-      </p:sp>
-    </p:spTree>
-  </p:cSld>
-  <p:clrMapOvr>
-    <a:masterClrMapping/>
-  </p:clrMapOvr>
-</p:sld>
-</file>
-
-<file path=ppt/slides/slide11.xml><?xml version="1.0" encoding="utf-8"?>
-<p:sld xmlns:a="http://schemas.openxmlformats.org/drawingml/2006/main" xmlns:r="http://schemas.openxmlformats.org/officeDocument/2006/relationships" xmlns:mc="http://schemas.openxmlformats.org/markup-compatibility/2006" xmlns:mv="urn:schemas-microsoft-com:mac:vml" xmlns:p="http://schemas.openxmlformats.org/presentationml/2006/main" mc:Ignorable="mv" mc:PreserveAttributes="mv:*">
-  <p:cSld>
-    <p:spTree>
-      <p:nvGrpSpPr>
-        <p:cNvPr id="1" name=""/>
-        <p:cNvGrpSpPr/>
-        <p:nvPr/>
-      </p:nvGrpSpPr>
-      <p:grpSpPr>
-        <a:xfrm>
-          <a:off x="0" y="0"/>
-          <a:ext cx="0" cy="0"/>
-          <a:chOff x="0" y="0"/>
-          <a:chExt cx="0" cy="0"/>
-        </a:xfrm>
-      </p:grpSpPr>
-      <p:sp>
-        <p:nvSpPr>
-          <p:cNvPr id="2" name="Title 1"/>
-          <p:cNvSpPr>
-            <a:spLocks noGrp="1"/>
-          </p:cNvSpPr>
-          <p:nvPr>
-            <p:ph type="title"/>
-          </p:nvPr>
-        </p:nvSpPr>
-        <p:spPr/>
-        <p:txBody>
-          <a:bodyPr/>
-          <a:lstStyle/>
-          <a:p>
-            <a:r>
-              <a:rPr lang="en-US" dirty="0" smtClean="0"/>
-              <a:t>Inheritance</a:t>
-            </a:r>
-            <a:endParaRPr lang="en-US" dirty="0"/>
-          </a:p>
-        </p:txBody>
-      </p:sp>
-      <p:sp>
-        <p:nvSpPr>
-          <p:cNvPr id="3" name="Content Placeholder 2"/>
-          <p:cNvSpPr>
-            <a:spLocks noGrp="1"/>
-          </p:cNvSpPr>
-          <p:nvPr>
-            <p:ph idx="1"/>
-          </p:nvPr>
-        </p:nvSpPr>
-        <p:spPr/>
-        <p:txBody>
-          <a:bodyPr/>
-          <a:lstStyle/>
-          <a:p>
-            <a:pPr marL="381000" indent="-381000">
-              <a:lnSpc>
-                <a:spcPct val="80000"/>
-              </a:lnSpc>
-            </a:pPr>
-            <a:endParaRPr lang="en-US" dirty="0" smtClean="0"/>
-          </a:p>
-          <a:p>
-            <a:pPr marL="381000" indent="-381000">
-              <a:lnSpc>
-                <a:spcPct val="80000"/>
-              </a:lnSpc>
-            </a:pPr>
-            <a:r>
-              <a:rPr lang="en-US" dirty="0" smtClean="0"/>
-              <a:t>The children of the </a:t>
-            </a:r>
-            <a:r>
-              <a:rPr lang="en-US" dirty="0" err="1" smtClean="0"/>
-              <a:t>superclass</a:t>
-            </a:r>
-            <a:r>
-              <a:rPr lang="en-US" dirty="0" smtClean="0"/>
-              <a:t> are called subclasses. In this example, </a:t>
-            </a:r>
-            <a:r>
-              <a:rPr lang="en-US" dirty="0" err="1" smtClean="0"/>
-              <a:t>SocialBird</a:t>
-            </a:r>
-            <a:r>
-              <a:rPr lang="en-US" dirty="0" smtClean="0"/>
-              <a:t> is a subclass of Bird, and Robin is a subclass of </a:t>
-            </a:r>
-            <a:r>
-              <a:rPr lang="en-US" dirty="0" err="1" smtClean="0"/>
-              <a:t>SocialBird</a:t>
-            </a:r>
-            <a:r>
-              <a:rPr lang="en-US" dirty="0" smtClean="0"/>
-              <a:t>. </a:t>
-            </a:r>
-          </a:p>
-          <a:p>
-            <a:pPr marL="381000" indent="-381000">
-              <a:lnSpc>
-                <a:spcPct val="80000"/>
-              </a:lnSpc>
-            </a:pPr>
-            <a:endParaRPr lang="en-US" dirty="0" smtClean="0"/>
-          </a:p>
-          <a:p>
-            <a:pPr marL="381000" indent="-381000">
-              <a:lnSpc>
-                <a:spcPct val="80000"/>
-              </a:lnSpc>
-            </a:pPr>
-            <a:endParaRPr lang="en-US" dirty="0" smtClean="0"/>
-          </a:p>
-          <a:p>
-            <a:pPr marL="381000" indent="-381000">
-              <a:lnSpc>
-                <a:spcPct val="80000"/>
-              </a:lnSpc>
-            </a:pPr>
-            <a:r>
-              <a:rPr lang="en-US" dirty="0" smtClean="0"/>
-              <a:t>abstract public class </a:t>
-            </a:r>
-            <a:r>
-              <a:rPr lang="en-US" dirty="0" err="1" smtClean="0"/>
-              <a:t>SocialBird</a:t>
-            </a:r>
-            <a:r>
-              <a:rPr lang="en-US" dirty="0" smtClean="0"/>
-              <a:t> extends Bird {</a:t>
-            </a:r>
-          </a:p>
-          <a:p>
-            <a:pPr marL="381000" indent="-381000">
-              <a:lnSpc>
-                <a:spcPct val="80000"/>
-              </a:lnSpc>
-            </a:pPr>
-            <a:r>
-              <a:rPr lang="en-US" dirty="0" smtClean="0"/>
-              <a:t>	</a:t>
-            </a:r>
-            <a:r>
-              <a:rPr lang="en-US" dirty="0" err="1" smtClean="0"/>
-              <a:t>int</a:t>
-            </a:r>
-            <a:r>
-              <a:rPr lang="en-US" dirty="0" smtClean="0"/>
-              <a:t> </a:t>
-            </a:r>
-            <a:r>
-              <a:rPr lang="en-US" dirty="0" err="1" smtClean="0"/>
-              <a:t>numFriends</a:t>
-            </a:r>
-            <a:r>
-              <a:rPr lang="en-US" dirty="0" smtClean="0"/>
-              <a:t>;	</a:t>
-            </a:r>
-          </a:p>
-          <a:p>
-            <a:pPr marL="381000" indent="-381000">
-              <a:lnSpc>
-                <a:spcPct val="80000"/>
-              </a:lnSpc>
-            </a:pPr>
-            <a:r>
-              <a:rPr lang="en-US" dirty="0" smtClean="0"/>
-              <a:t>	public </a:t>
-            </a:r>
-            <a:r>
-              <a:rPr lang="en-US" dirty="0" err="1" smtClean="0"/>
-              <a:t>SocialBird(String</a:t>
-            </a:r>
-            <a:r>
-              <a:rPr lang="en-US" dirty="0" smtClean="0"/>
-              <a:t> </a:t>
-            </a:r>
-            <a:r>
-              <a:rPr lang="en-US" dirty="0" err="1" smtClean="0"/>
-              <a:t>typeOfBird</a:t>
-            </a:r>
-            <a:r>
-              <a:rPr lang="en-US" dirty="0" smtClean="0"/>
-              <a:t>, </a:t>
-            </a:r>
-            <a:r>
-              <a:rPr lang="en-US" dirty="0" err="1" smtClean="0"/>
-              <a:t>int</a:t>
-            </a:r>
-            <a:r>
-              <a:rPr lang="en-US" dirty="0" smtClean="0"/>
-              <a:t> </a:t>
-            </a:r>
-            <a:r>
-              <a:rPr lang="en-US" dirty="0" err="1" smtClean="0"/>
-              <a:t>numFriends</a:t>
-            </a:r>
-            <a:r>
-              <a:rPr lang="en-US" dirty="0" smtClean="0"/>
-              <a:t>) {</a:t>
-            </a:r>
-          </a:p>
-          <a:p>
-            <a:pPr marL="381000" indent="-381000">
-              <a:lnSpc>
-                <a:spcPct val="80000"/>
-              </a:lnSpc>
-            </a:pPr>
-            <a:r>
-              <a:rPr lang="en-US" dirty="0" smtClean="0"/>
-              <a:t>		 	</a:t>
-            </a:r>
-            <a:r>
-              <a:rPr lang="en-US" dirty="0" err="1" smtClean="0"/>
-              <a:t>super(typeOfBird</a:t>
-            </a:r>
-            <a:r>
-              <a:rPr lang="en-US" dirty="0" smtClean="0"/>
-              <a:t>);</a:t>
-            </a:r>
-          </a:p>
-          <a:p>
-            <a:pPr marL="381000" indent="-381000">
-              <a:lnSpc>
-                <a:spcPct val="80000"/>
-              </a:lnSpc>
-            </a:pPr>
-            <a:r>
-              <a:rPr lang="en-US" dirty="0" smtClean="0"/>
-              <a:t>			</a:t>
-            </a:r>
-            <a:r>
-              <a:rPr lang="en-US" dirty="0" err="1" smtClean="0"/>
-              <a:t>this.numFriends</a:t>
-            </a:r>
-            <a:r>
-              <a:rPr lang="en-US" dirty="0" smtClean="0"/>
-              <a:t> = </a:t>
-            </a:r>
-            <a:r>
-              <a:rPr lang="en-US" dirty="0" err="1" smtClean="0"/>
-              <a:t>numFriends</a:t>
-            </a:r>
-            <a:r>
-              <a:rPr lang="en-US" dirty="0" smtClean="0"/>
-              <a:t>;</a:t>
-            </a:r>
-          </a:p>
-          <a:p>
-            <a:pPr marL="381000" indent="-381000">
-              <a:lnSpc>
-                <a:spcPct val="80000"/>
-              </a:lnSpc>
-            </a:pPr>
-            <a:r>
-              <a:rPr lang="en-US" dirty="0" smtClean="0"/>
-              <a:t>	}</a:t>
-            </a:r>
-          </a:p>
-          <a:p>
-            <a:pPr marL="381000" indent="-381000">
-              <a:lnSpc>
-                <a:spcPct val="80000"/>
-              </a:lnSpc>
-            </a:pPr>
-            <a:r>
-              <a:rPr lang="en-US" dirty="0" smtClean="0"/>
-              <a:t>}</a:t>
-            </a:r>
-          </a:p>
-          <a:p>
-            <a:pPr marL="381000" indent="-381000">
-              <a:lnSpc>
-                <a:spcPct val="80000"/>
-              </a:lnSpc>
-            </a:pPr>
-            <a:endParaRPr lang="en-US" dirty="0" smtClean="0"/>
-          </a:p>
-          <a:p>
-            <a:pPr marL="381000" indent="-381000">
-              <a:lnSpc>
-                <a:spcPct val="80000"/>
-              </a:lnSpc>
-            </a:pPr>
-            <a:r>
-              <a:rPr lang="en-US" dirty="0" smtClean="0"/>
-              <a:t>public class Robin extends </a:t>
-            </a:r>
-            <a:r>
-              <a:rPr lang="en-US" dirty="0" err="1" smtClean="0"/>
-              <a:t>SocialBird</a:t>
-            </a:r>
-            <a:r>
-              <a:rPr lang="en-US" dirty="0" smtClean="0"/>
-              <a:t> {</a:t>
-            </a:r>
-          </a:p>
-          <a:p>
-            <a:pPr marL="381000" indent="-381000">
-              <a:lnSpc>
-                <a:spcPct val="80000"/>
-              </a:lnSpc>
-            </a:pPr>
-            <a:r>
-              <a:rPr lang="en-US" dirty="0" smtClean="0"/>
-              <a:t>	public Robin() {</a:t>
-            </a:r>
-          </a:p>
-          <a:p>
-            <a:pPr marL="381000" indent="-381000">
-              <a:lnSpc>
-                <a:spcPct val="80000"/>
-              </a:lnSpc>
-            </a:pPr>
-            <a:r>
-              <a:rPr lang="en-US" dirty="0" smtClean="0"/>
-              <a:t>			</a:t>
-            </a:r>
-            <a:r>
-              <a:rPr lang="en-US" dirty="0" err="1" smtClean="0"/>
-              <a:t>super("Robin</a:t>
-            </a:r>
-            <a:r>
-              <a:rPr lang="en-US" dirty="0" smtClean="0"/>
-              <a:t>", 10);</a:t>
-            </a:r>
-          </a:p>
-          <a:p>
-            <a:pPr marL="381000" indent="-381000">
-              <a:lnSpc>
-                <a:spcPct val="80000"/>
-              </a:lnSpc>
-            </a:pPr>
-            <a:r>
-              <a:rPr lang="en-US" dirty="0" smtClean="0"/>
-              <a:t>	}</a:t>
-            </a:r>
-          </a:p>
-          <a:p>
-            <a:pPr marL="381000" indent="-381000">
-              <a:lnSpc>
-                <a:spcPct val="80000"/>
-              </a:lnSpc>
-            </a:pPr>
-            <a:endParaRPr lang="en-US" dirty="0" smtClean="0"/>
-          </a:p>
-          <a:p>
-            <a:pPr marL="381000" indent="-381000">
-              <a:lnSpc>
-                <a:spcPct val="80000"/>
-              </a:lnSpc>
-            </a:pPr>
-            <a:r>
-              <a:rPr lang="en-US" dirty="0" smtClean="0"/>
-              <a:t>	public void </a:t>
-            </a:r>
-            <a:r>
-              <a:rPr lang="en-US" dirty="0" err="1" smtClean="0"/>
-              <a:t>nextPosition</a:t>
-            </a:r>
-            <a:r>
-              <a:rPr lang="en-US" dirty="0" smtClean="0"/>
-              <a:t>() {</a:t>
-            </a:r>
-          </a:p>
-          <a:p>
-            <a:pPr marL="381000" indent="-381000">
-              <a:lnSpc>
-                <a:spcPct val="80000"/>
-              </a:lnSpc>
-            </a:pPr>
-            <a:r>
-              <a:rPr lang="en-US" dirty="0" smtClean="0"/>
-              <a:t>			//figure out next point based on current position and nearby friends</a:t>
-            </a:r>
-          </a:p>
-          <a:p>
-            <a:pPr marL="381000" indent="-381000">
-              <a:lnSpc>
-                <a:spcPct val="80000"/>
-              </a:lnSpc>
-            </a:pPr>
-            <a:r>
-              <a:rPr lang="en-US" dirty="0" smtClean="0"/>
-              <a:t>			</a:t>
-            </a:r>
-            <a:r>
-              <a:rPr lang="en-US" dirty="0" err="1" smtClean="0"/>
-              <a:t>currentPostion</a:t>
-            </a:r>
-            <a:r>
-              <a:rPr lang="en-US" dirty="0" smtClean="0"/>
-              <a:t> = ... //some complicated logic...</a:t>
-            </a:r>
-          </a:p>
-          <a:p>
-            <a:pPr marL="381000" indent="-381000">
-              <a:lnSpc>
-                <a:spcPct val="80000"/>
-              </a:lnSpc>
-            </a:pPr>
-            <a:r>
-              <a:rPr lang="en-US" dirty="0" smtClean="0"/>
-              <a:t>	}</a:t>
-            </a:r>
-          </a:p>
-          <a:p>
-            <a:pPr marL="381000" indent="-381000">
-              <a:lnSpc>
-                <a:spcPct val="80000"/>
-              </a:lnSpc>
-            </a:pPr>
-            <a:r>
-              <a:rPr lang="en-US" dirty="0" smtClean="0"/>
-              <a:t>}</a:t>
-            </a:r>
-          </a:p>
-          <a:p>
-            <a:pPr marL="381000" indent="-381000">
-              <a:lnSpc>
-                <a:spcPct val="80000"/>
-              </a:lnSpc>
-            </a:pPr>
-            <a:endParaRPr lang="en-US" dirty="0" smtClean="0"/>
-          </a:p>
-          <a:p>
-            <a:pPr marL="381000" indent="-381000">
-              <a:lnSpc>
-                <a:spcPct val="80000"/>
-              </a:lnSpc>
-            </a:pPr>
-            <a:r>
-              <a:rPr lang="en-US" dirty="0" smtClean="0"/>
-              <a:t>	</a:t>
-            </a:r>
-          </a:p>
-          <a:p>
-            <a:pPr marL="381000" indent="-381000">
-              <a:lnSpc>
-                <a:spcPct val="80000"/>
-              </a:lnSpc>
-            </a:pPr>
-            <a:endParaRPr lang="en-US" dirty="0" smtClean="0"/>
-          </a:p>
-          <a:p>
-            <a:endParaRPr lang="en-US" dirty="0"/>
-          </a:p>
-        </p:txBody>
-      </p:sp>
-    </p:spTree>
-  </p:cSld>
-  <p:clrMapOvr>
-    <a:masterClrMapping/>
-  </p:clrMapOvr>
-</p:sld>
-</file>
-
-<file path=ppt/slides/slide12.xml><?xml version="1.0" encoding="utf-8"?>
-<p:sld xmlns:a="http://schemas.openxmlformats.org/drawingml/2006/main" xmlns:r="http://schemas.openxmlformats.org/officeDocument/2006/relationships" xmlns:mc="http://schemas.openxmlformats.org/markup-compatibility/2006" xmlns:mv="urn:schemas-microsoft-com:mac:vml" xmlns:p="http://schemas.openxmlformats.org/presentationml/2006/main" mc:Ignorable="mv" mc:PreserveAttributes="mv:*">
-  <p:cSld>
-    <p:spTree>
-      <p:nvGrpSpPr>
-        <p:cNvPr id="1" name=""/>
-        <p:cNvGrpSpPr/>
-        <p:nvPr/>
-      </p:nvGrpSpPr>
-      <p:grpSpPr>
-        <a:xfrm>
-          <a:off x="0" y="0"/>
-          <a:ext cx="0" cy="0"/>
-          <a:chOff x="0" y="0"/>
-          <a:chExt cx="0" cy="0"/>
-        </a:xfrm>
-      </p:grpSpPr>
-      <p:sp>
-        <p:nvSpPr>
-          <p:cNvPr id="2" name="Title 1"/>
-          <p:cNvSpPr>
-            <a:spLocks noGrp="1"/>
-          </p:cNvSpPr>
-          <p:nvPr>
-            <p:ph type="title"/>
-          </p:nvPr>
-        </p:nvSpPr>
-        <p:spPr/>
-        <p:txBody>
-          <a:bodyPr/>
-          <a:lstStyle/>
-          <a:p>
-            <a:r>
-              <a:rPr lang="en-US" dirty="0" smtClean="0"/>
-              <a:t>Inheritance</a:t>
-            </a:r>
-            <a:endParaRPr lang="en-US" dirty="0"/>
-          </a:p>
-        </p:txBody>
-      </p:sp>
-      <p:sp>
-        <p:nvSpPr>
-          <p:cNvPr id="3" name="Content Placeholder 2"/>
-          <p:cNvSpPr>
-            <a:spLocks noGrp="1"/>
-          </p:cNvSpPr>
-          <p:nvPr>
-            <p:ph idx="1"/>
-          </p:nvPr>
-        </p:nvSpPr>
-        <p:spPr/>
-        <p:txBody>
-          <a:bodyPr/>
-          <a:lstStyle/>
-          <a:p>
-            <a:pPr marL="381000" indent="-381000">
-              <a:lnSpc>
-                <a:spcPct val="80000"/>
-              </a:lnSpc>
-            </a:pPr>
-            <a:endParaRPr lang="en-US" dirty="0" smtClean="0"/>
-          </a:p>
-          <a:p>
-            <a:pPr marL="381000" indent="-381000">
-              <a:lnSpc>
-                <a:spcPct val="80000"/>
-              </a:lnSpc>
-            </a:pPr>
-            <a:endParaRPr lang="en-US" dirty="0" smtClean="0"/>
-          </a:p>
-          <a:p>
-            <a:pPr marL="381000" indent="-381000">
-              <a:lnSpc>
-                <a:spcPct val="80000"/>
-              </a:lnSpc>
-            </a:pPr>
-            <a:r>
-              <a:rPr lang="en-US" dirty="0" smtClean="0"/>
-              <a:t>abstract public class </a:t>
-            </a:r>
-            <a:r>
-              <a:rPr lang="en-US" dirty="0" err="1" smtClean="0"/>
-              <a:t>IconoclastBird</a:t>
-            </a:r>
-            <a:r>
-              <a:rPr lang="en-US" dirty="0" smtClean="0"/>
-              <a:t>	extends Bird {</a:t>
-            </a:r>
-          </a:p>
-          <a:p>
-            <a:pPr marL="381000" indent="-381000">
-              <a:lnSpc>
-                <a:spcPct val="80000"/>
-              </a:lnSpc>
-            </a:pPr>
-            <a:r>
-              <a:rPr lang="en-US" dirty="0" smtClean="0"/>
-              <a:t>	public </a:t>
-            </a:r>
-            <a:r>
-              <a:rPr lang="en-US" dirty="0" err="1" smtClean="0"/>
-              <a:t>IconoclastBird(String</a:t>
-            </a:r>
-            <a:r>
-              <a:rPr lang="en-US" dirty="0" smtClean="0"/>
-              <a:t> </a:t>
-            </a:r>
-            <a:r>
-              <a:rPr lang="en-US" dirty="0" err="1" smtClean="0"/>
-              <a:t>typeOfBird</a:t>
-            </a:r>
-            <a:r>
-              <a:rPr lang="en-US" dirty="0" smtClean="0"/>
-              <a:t>) {</a:t>
-            </a:r>
-          </a:p>
-          <a:p>
-            <a:pPr marL="381000" indent="-381000">
-              <a:lnSpc>
-                <a:spcPct val="80000"/>
-              </a:lnSpc>
-            </a:pPr>
-            <a:r>
-              <a:rPr lang="en-US" dirty="0" smtClean="0"/>
-              <a:t>			</a:t>
-            </a:r>
-            <a:r>
-              <a:rPr lang="en-US" dirty="0" err="1" smtClean="0"/>
-              <a:t>super(typeOfBird</a:t>
-            </a:r>
-            <a:r>
-              <a:rPr lang="en-US" dirty="0" smtClean="0"/>
-              <a:t>);</a:t>
-            </a:r>
-          </a:p>
-          <a:p>
-            <a:pPr marL="381000" indent="-381000">
-              <a:lnSpc>
-                <a:spcPct val="80000"/>
-              </a:lnSpc>
-            </a:pPr>
-            <a:r>
-              <a:rPr lang="en-US" dirty="0" smtClean="0"/>
-              <a:t>	}</a:t>
-            </a:r>
-          </a:p>
-          <a:p>
-            <a:pPr marL="381000" indent="-381000">
-              <a:lnSpc>
-                <a:spcPct val="80000"/>
-              </a:lnSpc>
-            </a:pPr>
-            <a:r>
-              <a:rPr lang="en-US" dirty="0" smtClean="0"/>
-              <a:t>}	</a:t>
-            </a:r>
-          </a:p>
-          <a:p>
-            <a:pPr marL="381000" indent="-381000">
-              <a:lnSpc>
-                <a:spcPct val="80000"/>
-              </a:lnSpc>
-            </a:pPr>
-            <a:endParaRPr lang="en-US" dirty="0" smtClean="0"/>
-          </a:p>
-          <a:p>
-            <a:pPr marL="381000" indent="-381000">
-              <a:lnSpc>
-                <a:spcPct val="80000"/>
-              </a:lnSpc>
-            </a:pPr>
-            <a:endParaRPr lang="en-US" dirty="0" smtClean="0"/>
-          </a:p>
-          <a:p>
-            <a:pPr marL="381000" indent="-381000">
-              <a:lnSpc>
-                <a:spcPct val="80000"/>
-              </a:lnSpc>
-            </a:pPr>
-            <a:r>
-              <a:rPr lang="en-US" dirty="0" smtClean="0"/>
-              <a:t>public class Eagle extends </a:t>
-            </a:r>
-            <a:r>
-              <a:rPr lang="en-US" dirty="0" err="1" smtClean="0"/>
-              <a:t>IconoclastBird</a:t>
-            </a:r>
-            <a:r>
-              <a:rPr lang="en-US" dirty="0" smtClean="0"/>
-              <a:t> {</a:t>
-            </a:r>
-          </a:p>
-          <a:p>
-            <a:pPr marL="381000" indent="-381000">
-              <a:lnSpc>
-                <a:spcPct val="80000"/>
-              </a:lnSpc>
-            </a:pPr>
-            <a:r>
-              <a:rPr lang="en-US" dirty="0" smtClean="0"/>
-              <a:t>	public Eagle() {</a:t>
-            </a:r>
-          </a:p>
-          <a:p>
-            <a:pPr marL="381000" indent="-381000">
-              <a:lnSpc>
-                <a:spcPct val="80000"/>
-              </a:lnSpc>
-            </a:pPr>
-            <a:r>
-              <a:rPr lang="en-US" dirty="0" smtClean="0"/>
-              <a:t>			</a:t>
-            </a:r>
-            <a:r>
-              <a:rPr lang="en-US" dirty="0" err="1" smtClean="0"/>
-              <a:t>super("Eagle</a:t>
-            </a:r>
-            <a:r>
-              <a:rPr lang="en-US" dirty="0" smtClean="0"/>
-              <a:t>");</a:t>
-            </a:r>
-          </a:p>
-          <a:p>
-            <a:pPr marL="381000" indent="-381000">
-              <a:lnSpc>
-                <a:spcPct val="80000"/>
-              </a:lnSpc>
-            </a:pPr>
-            <a:r>
-              <a:rPr lang="en-US" dirty="0" smtClean="0"/>
-              <a:t>	}</a:t>
-            </a:r>
-          </a:p>
-          <a:p>
-            <a:pPr marL="381000" indent="-381000">
-              <a:lnSpc>
-                <a:spcPct val="80000"/>
-              </a:lnSpc>
-            </a:pPr>
-            <a:endParaRPr lang="en-US" dirty="0" smtClean="0"/>
-          </a:p>
-          <a:p>
-            <a:pPr marL="381000" indent="-381000">
-              <a:lnSpc>
-                <a:spcPct val="80000"/>
-              </a:lnSpc>
-            </a:pPr>
-            <a:r>
-              <a:rPr lang="en-US" dirty="0" smtClean="0"/>
-              <a:t>	public void </a:t>
-            </a:r>
-            <a:r>
-              <a:rPr lang="en-US" dirty="0" err="1" smtClean="0"/>
-              <a:t>nextPosition</a:t>
-            </a:r>
-            <a:r>
-              <a:rPr lang="en-US" dirty="0" smtClean="0"/>
-              <a:t>() {</a:t>
-            </a:r>
-          </a:p>
-          <a:p>
-            <a:pPr marL="381000" indent="-381000">
-              <a:lnSpc>
-                <a:spcPct val="80000"/>
-              </a:lnSpc>
-            </a:pPr>
-            <a:r>
-              <a:rPr lang="en-US" dirty="0" smtClean="0"/>
-              <a:t>			//the Eagle has no friends and always goes straight</a:t>
-            </a:r>
-          </a:p>
-          <a:p>
-            <a:pPr marL="381000" indent="-381000">
-              <a:lnSpc>
-                <a:spcPct val="80000"/>
-              </a:lnSpc>
-            </a:pPr>
-            <a:r>
-              <a:rPr lang="en-US" dirty="0" smtClean="0"/>
-              <a:t>			</a:t>
-            </a:r>
-            <a:r>
-              <a:rPr lang="en-US" dirty="0" err="1" smtClean="0"/>
-              <a:t>currentPostion</a:t>
-            </a:r>
-            <a:r>
-              <a:rPr lang="en-US" dirty="0" smtClean="0"/>
-              <a:t> = new </a:t>
-            </a:r>
-            <a:r>
-              <a:rPr lang="en-US" dirty="0" err="1" smtClean="0"/>
-              <a:t>Point(currentPosition.x</a:t>
-            </a:r>
-            <a:r>
-              <a:rPr lang="en-US" dirty="0" smtClean="0"/>
-              <a:t> + 1, </a:t>
-            </a:r>
-            <a:r>
-              <a:rPr lang="en-US" dirty="0" err="1" smtClean="0"/>
-              <a:t>currentPostion.y</a:t>
-            </a:r>
-            <a:r>
-              <a:rPr lang="en-US" dirty="0" smtClean="0"/>
-              <a:t> + 1);</a:t>
-            </a:r>
-          </a:p>
-          <a:p>
-            <a:pPr marL="381000" indent="-381000">
-              <a:lnSpc>
-                <a:spcPct val="80000"/>
-              </a:lnSpc>
-            </a:pPr>
-            <a:r>
-              <a:rPr lang="en-US" dirty="0" smtClean="0"/>
-              <a:t>	}</a:t>
-            </a:r>
-          </a:p>
-          <a:p>
-            <a:pPr marL="381000" indent="-381000">
-              <a:lnSpc>
-                <a:spcPct val="80000"/>
-              </a:lnSpc>
-            </a:pPr>
-            <a:r>
-              <a:rPr lang="en-US" dirty="0" smtClean="0"/>
-              <a:t>}</a:t>
-            </a:r>
-          </a:p>
-          <a:p>
-            <a:pPr marL="381000" indent="-381000">
-              <a:lnSpc>
-                <a:spcPct val="80000"/>
-              </a:lnSpc>
-            </a:pPr>
-            <a:endParaRPr lang="en-US" dirty="0" smtClean="0"/>
-          </a:p>
-          <a:p>
-            <a:pPr marL="381000" indent="-381000">
-              <a:lnSpc>
-                <a:spcPct val="80000"/>
-              </a:lnSpc>
-            </a:pPr>
-            <a:r>
-              <a:rPr lang="en-US" dirty="0" smtClean="0"/>
-              <a:t>(draw inheritance on board...)</a:t>
-            </a:r>
-          </a:p>
-          <a:p>
-            <a:pPr marL="381000" indent="-381000">
-              <a:lnSpc>
-                <a:spcPct val="80000"/>
-              </a:lnSpc>
-            </a:pPr>
-            <a:r>
-              <a:rPr lang="en-US" dirty="0" smtClean="0"/>
-              <a:t>	</a:t>
-            </a:r>
-          </a:p>
-          <a:p>
-            <a:pPr marL="381000" indent="-381000">
-              <a:lnSpc>
-                <a:spcPct val="80000"/>
-              </a:lnSpc>
-            </a:pPr>
-            <a:endParaRPr lang="en-US" dirty="0" smtClean="0"/>
-          </a:p>
-          <a:p>
-            <a:endParaRPr lang="en-US" dirty="0"/>
-          </a:p>
-        </p:txBody>
-      </p:sp>
-    </p:spTree>
-  </p:cSld>
-  <p:clrMapOvr>
-    <a:masterClrMapping/>
-  </p:clrMapOvr>
-</p:sld>
-</file>
-
-<file path=ppt/slides/slide13.xml><?xml version="1.0" encoding="utf-8"?>
-<p:sld xmlns:a="http://schemas.openxmlformats.org/drawingml/2006/main" xmlns:r="http://schemas.openxmlformats.org/officeDocument/2006/relationships" xmlns:mc="http://schemas.openxmlformats.org/markup-compatibility/2006" xmlns:mv="urn:schemas-microsoft-com:mac:vml" xmlns:p="http://schemas.openxmlformats.org/presentationml/2006/main" mc:Ignorable="mv" mc:PreserveAttributes="mv:*">
-  <p:cSld>
-    <p:spTree>
-      <p:nvGrpSpPr>
-        <p:cNvPr id="1" name=""/>
-        <p:cNvGrpSpPr/>
-        <p:nvPr/>
-      </p:nvGrpSpPr>
-      <p:grpSpPr>
-        <a:xfrm>
-          <a:off x="0" y="0"/>
-          <a:ext cx="0" cy="0"/>
-          <a:chOff x="0" y="0"/>
-          <a:chExt cx="0" cy="0"/>
-        </a:xfrm>
-      </p:grpSpPr>
-      <p:sp>
-        <p:nvSpPr>
-          <p:cNvPr id="2" name="Title 1"/>
-          <p:cNvSpPr>
-            <a:spLocks noGrp="1"/>
-          </p:cNvSpPr>
-          <p:nvPr>
-            <p:ph type="title"/>
-          </p:nvPr>
-        </p:nvSpPr>
-        <p:spPr/>
-        <p:txBody>
-          <a:bodyPr/>
-          <a:lstStyle/>
-          <a:p>
-            <a:r>
-              <a:rPr lang="en-US" dirty="0" smtClean="0"/>
-              <a:t>Polymorphism</a:t>
-            </a:r>
-            <a:endParaRPr lang="en-US" dirty="0"/>
-          </a:p>
-        </p:txBody>
-      </p:sp>
-      <p:sp>
-        <p:nvSpPr>
-          <p:cNvPr id="3" name="Content Placeholder 2"/>
-          <p:cNvSpPr>
-            <a:spLocks noGrp="1"/>
-          </p:cNvSpPr>
-          <p:nvPr>
-            <p:ph idx="1"/>
-          </p:nvPr>
-        </p:nvSpPr>
-        <p:spPr/>
-        <p:txBody>
-          <a:bodyPr/>
-          <a:lstStyle/>
-          <a:p>
-            <a:pPr marL="381000" indent="-381000">
-              <a:lnSpc>
-                <a:spcPct val="80000"/>
-              </a:lnSpc>
-            </a:pPr>
-            <a:endParaRPr lang="en-US" dirty="0" smtClean="0"/>
-          </a:p>
-          <a:p>
-            <a:pPr marL="381000" indent="-381000">
-              <a:lnSpc>
-                <a:spcPct val="80000"/>
-              </a:lnSpc>
-            </a:pPr>
-            <a:r>
-              <a:rPr lang="en-US" dirty="0" smtClean="0"/>
-              <a:t>In the above example, the </a:t>
-            </a:r>
-            <a:r>
-              <a:rPr lang="en-US" dirty="0" err="1" smtClean="0"/>
-              <a:t>nextPostion</a:t>
-            </a:r>
-            <a:r>
-              <a:rPr lang="en-US" dirty="0" smtClean="0"/>
-              <a:t> method was polymorphic.</a:t>
-            </a:r>
-          </a:p>
-          <a:p>
-            <a:pPr marL="381000" indent="-381000">
-              <a:lnSpc>
-                <a:spcPct val="80000"/>
-              </a:lnSpc>
-            </a:pPr>
-            <a:endParaRPr lang="en-US" dirty="0" smtClean="0"/>
-          </a:p>
-          <a:p>
-            <a:pPr marL="381000" indent="-381000">
-              <a:lnSpc>
-                <a:spcPct val="80000"/>
-              </a:lnSpc>
-            </a:pPr>
-            <a:r>
-              <a:rPr lang="en-US" dirty="0" smtClean="0"/>
-              <a:t>Polymorphism means that you can call an operator on a super type of the object and the language will, on the fly, figure out the most specific thing it could possible mean and execute that method.</a:t>
-            </a:r>
-          </a:p>
-          <a:p>
-            <a:pPr marL="381000" indent="-381000">
-              <a:lnSpc>
-                <a:spcPct val="80000"/>
-              </a:lnSpc>
-            </a:pPr>
-            <a:endParaRPr lang="en-US" dirty="0" smtClean="0"/>
-          </a:p>
-          <a:p>
-            <a:pPr marL="381000" indent="-381000">
-              <a:lnSpc>
-                <a:spcPct val="80000"/>
-              </a:lnSpc>
-            </a:pPr>
-            <a:r>
-              <a:rPr lang="en-US" dirty="0" smtClean="0"/>
-              <a:t>Since our base class, Bird, has a method called </a:t>
-            </a:r>
-            <a:r>
-              <a:rPr lang="en-US" i="1" dirty="0" err="1" smtClean="0"/>
-              <a:t>nextPosition</a:t>
-            </a:r>
-            <a:r>
-              <a:rPr lang="en-US" dirty="0" smtClean="0"/>
-              <a:t>, all classes that extend Bird are </a:t>
-            </a:r>
-            <a:r>
-              <a:rPr lang="en-US" dirty="0" err="1" smtClean="0"/>
-              <a:t>guarenteed</a:t>
-            </a:r>
-            <a:r>
-              <a:rPr lang="en-US" dirty="0" smtClean="0"/>
-              <a:t> to have that class as well. They can also override it. If they do override it, the language will always know to use that version of it, even if you aren't referring to the specific type explicitly. </a:t>
-            </a:r>
-          </a:p>
-          <a:p>
-            <a:pPr marL="381000" indent="-381000">
-              <a:lnSpc>
-                <a:spcPct val="80000"/>
-              </a:lnSpc>
-            </a:pPr>
-            <a:endParaRPr lang="en-US" dirty="0" smtClean="0"/>
-          </a:p>
-          <a:p>
-            <a:pPr marL="381000" indent="-381000">
-              <a:lnSpc>
-                <a:spcPct val="80000"/>
-              </a:lnSpc>
-            </a:pPr>
-            <a:r>
-              <a:rPr lang="en-US" dirty="0" smtClean="0"/>
-              <a:t>public class </a:t>
-            </a:r>
-            <a:r>
-              <a:rPr lang="en-US" dirty="0" err="1" smtClean="0"/>
-              <a:t>BirdSimulation</a:t>
-            </a:r>
-            <a:r>
-              <a:rPr lang="en-US" dirty="0" smtClean="0"/>
-              <a:t> {</a:t>
-            </a:r>
-          </a:p>
-          <a:p>
-            <a:pPr marL="381000" indent="-381000">
-              <a:lnSpc>
-                <a:spcPct val="80000"/>
-              </a:lnSpc>
-            </a:pPr>
-            <a:r>
-              <a:rPr lang="en-US" dirty="0" smtClean="0"/>
-              <a:t>	public static void </a:t>
-            </a:r>
-            <a:r>
-              <a:rPr lang="en-US" dirty="0" err="1" smtClean="0"/>
-              <a:t>main(String</a:t>
-            </a:r>
-            <a:r>
-              <a:rPr lang="en-US" dirty="0" smtClean="0"/>
-              <a:t>[] </a:t>
-            </a:r>
-            <a:r>
-              <a:rPr lang="en-US" dirty="0" err="1" smtClean="0"/>
-              <a:t>args</a:t>
-            </a:r>
-            <a:r>
-              <a:rPr lang="en-US" dirty="0" smtClean="0"/>
-              <a:t>) {</a:t>
-            </a:r>
-          </a:p>
-          <a:p>
-            <a:pPr marL="381000" indent="-381000">
-              <a:lnSpc>
-                <a:spcPct val="80000"/>
-              </a:lnSpc>
-            </a:pPr>
-            <a:r>
-              <a:rPr lang="en-US" dirty="0" smtClean="0"/>
-              <a:t>		new </a:t>
-            </a:r>
-            <a:r>
-              <a:rPr lang="en-US" dirty="0" err="1" smtClean="0"/>
-              <a:t>BirdSimulation</a:t>
-            </a:r>
-            <a:r>
-              <a:rPr lang="en-US" dirty="0" smtClean="0"/>
-              <a:t>();</a:t>
-            </a:r>
-          </a:p>
-          <a:p>
-            <a:pPr marL="381000" indent="-381000">
-              <a:lnSpc>
-                <a:spcPct val="80000"/>
-              </a:lnSpc>
-            </a:pPr>
-            <a:r>
-              <a:rPr lang="en-US" dirty="0" smtClean="0"/>
-              <a:t>	}</a:t>
-            </a:r>
-          </a:p>
-          <a:p>
-            <a:pPr marL="381000" indent="-381000">
-              <a:lnSpc>
-                <a:spcPct val="80000"/>
-              </a:lnSpc>
-            </a:pPr>
-            <a:r>
-              <a:rPr lang="en-US" dirty="0" smtClean="0"/>
-              <a:t>	public </a:t>
-            </a:r>
-            <a:r>
-              <a:rPr lang="en-US" dirty="0" err="1" smtClean="0"/>
-              <a:t>BirdSimluation</a:t>
-            </a:r>
-            <a:r>
-              <a:rPr lang="en-US" dirty="0" smtClean="0"/>
-              <a:t>() {</a:t>
-            </a:r>
-          </a:p>
-          <a:p>
-            <a:pPr marL="381000" indent="-381000">
-              <a:lnSpc>
-                <a:spcPct val="80000"/>
-              </a:lnSpc>
-            </a:pPr>
-            <a:r>
-              <a:rPr lang="en-US" dirty="0" smtClean="0"/>
-              <a:t>		List birds = new </a:t>
-            </a:r>
-            <a:r>
-              <a:rPr lang="en-US" dirty="0" err="1" smtClean="0"/>
-              <a:t>ArrayList</a:t>
-            </a:r>
-            <a:r>
-              <a:rPr lang="en-US" dirty="0" smtClean="0"/>
-              <a:t>();</a:t>
-            </a:r>
-          </a:p>
-          <a:p>
-            <a:pPr marL="381000" indent="-381000">
-              <a:lnSpc>
-                <a:spcPct val="80000"/>
-              </a:lnSpc>
-            </a:pPr>
-            <a:r>
-              <a:rPr lang="en-US" dirty="0" smtClean="0"/>
-              <a:t>		</a:t>
-            </a:r>
-            <a:r>
-              <a:rPr lang="en-US" dirty="0" err="1" smtClean="0"/>
-              <a:t>birds.add(new</a:t>
-            </a:r>
-            <a:r>
-              <a:rPr lang="en-US" dirty="0" smtClean="0"/>
-              <a:t> Robin());</a:t>
-            </a:r>
-          </a:p>
-          <a:p>
-            <a:pPr marL="381000" indent="-381000">
-              <a:lnSpc>
-                <a:spcPct val="80000"/>
-              </a:lnSpc>
-            </a:pPr>
-            <a:r>
-              <a:rPr lang="en-US" dirty="0" smtClean="0"/>
-              <a:t>		</a:t>
-            </a:r>
-            <a:r>
-              <a:rPr lang="en-US" dirty="0" err="1" smtClean="0"/>
-              <a:t>brids.add(new</a:t>
-            </a:r>
-            <a:r>
-              <a:rPr lang="en-US" dirty="0" smtClean="0"/>
-              <a:t> Eagle());</a:t>
-            </a:r>
-          </a:p>
-          <a:p>
-            <a:pPr marL="381000" indent="-381000">
-              <a:lnSpc>
-                <a:spcPct val="80000"/>
-              </a:lnSpc>
-            </a:pPr>
-            <a:endParaRPr lang="en-US" dirty="0" smtClean="0"/>
-          </a:p>
-          <a:p>
-            <a:pPr marL="381000" indent="-381000">
-              <a:lnSpc>
-                <a:spcPct val="80000"/>
-              </a:lnSpc>
-            </a:pPr>
-            <a:r>
-              <a:rPr lang="en-US" dirty="0" smtClean="0"/>
-              <a:t>	 for (</a:t>
-            </a:r>
-            <a:r>
-              <a:rPr lang="en-US" dirty="0" err="1" smtClean="0"/>
-              <a:t>int</a:t>
-            </a:r>
-            <a:r>
-              <a:rPr lang="en-US" dirty="0" smtClean="0"/>
-              <a:t> </a:t>
-            </a:r>
-            <a:r>
-              <a:rPr lang="en-US" dirty="0" err="1" smtClean="0"/>
-              <a:t>i</a:t>
-            </a:r>
-            <a:r>
-              <a:rPr lang="en-US" dirty="0" smtClean="0"/>
-              <a:t> = 0; </a:t>
-            </a:r>
-            <a:r>
-              <a:rPr lang="en-US" dirty="0" err="1" smtClean="0"/>
-              <a:t>i</a:t>
-            </a:r>
-            <a:r>
-              <a:rPr lang="en-US" dirty="0" smtClean="0"/>
-              <a:t> &lt; </a:t>
-            </a:r>
-            <a:r>
-              <a:rPr lang="en-US" dirty="0" err="1" smtClean="0"/>
-              <a:t>birds.size</a:t>
-            </a:r>
-            <a:r>
-              <a:rPr lang="en-US" dirty="0" smtClean="0"/>
-              <a:t>(); </a:t>
-            </a:r>
-            <a:r>
-              <a:rPr lang="en-US" dirty="0" err="1" smtClean="0"/>
-              <a:t>i</a:t>
-            </a:r>
-            <a:r>
-              <a:rPr lang="en-US" dirty="0" smtClean="0"/>
-              <a:t>++) {</a:t>
-            </a:r>
-          </a:p>
-          <a:p>
-            <a:pPr marL="381000" indent="-381000">
-              <a:lnSpc>
-                <a:spcPct val="80000"/>
-              </a:lnSpc>
-            </a:pPr>
-            <a:r>
-              <a:rPr lang="en-US" dirty="0" smtClean="0"/>
-              <a:t>			Bird </a:t>
-            </a:r>
-            <a:r>
-              <a:rPr lang="en-US" dirty="0" err="1" smtClean="0"/>
-              <a:t>b</a:t>
-            </a:r>
-            <a:r>
-              <a:rPr lang="en-US" dirty="0" smtClean="0"/>
-              <a:t> = (Bird) </a:t>
-            </a:r>
-            <a:r>
-              <a:rPr lang="en-US" dirty="0" err="1" smtClean="0"/>
-              <a:t>birds.get(i</a:t>
-            </a:r>
-            <a:r>
-              <a:rPr lang="en-US" dirty="0" smtClean="0"/>
-              <a:t>);</a:t>
-            </a:r>
-          </a:p>
-          <a:p>
-            <a:pPr marL="381000" indent="-381000">
-              <a:lnSpc>
-                <a:spcPct val="80000"/>
-              </a:lnSpc>
-            </a:pPr>
-            <a:r>
-              <a:rPr lang="en-US" dirty="0" smtClean="0"/>
-              <a:t>			</a:t>
-            </a:r>
-            <a:r>
-              <a:rPr lang="en-US" dirty="0" err="1" smtClean="0"/>
-              <a:t>b.nextPosition</a:t>
-            </a:r>
-            <a:r>
-              <a:rPr lang="en-US" dirty="0" smtClean="0"/>
-              <a:t>(); //automatically figures out what subtype this Bird is</a:t>
-            </a:r>
-          </a:p>
-          <a:p>
-            <a:pPr marL="381000" indent="-381000">
-              <a:lnSpc>
-                <a:spcPct val="80000"/>
-              </a:lnSpc>
-            </a:pPr>
-            <a:r>
-              <a:rPr lang="en-US" dirty="0" smtClean="0"/>
-              <a:t>			</a:t>
-            </a:r>
-            <a:r>
-              <a:rPr lang="en-US" dirty="0" err="1" smtClean="0"/>
-              <a:t>println(b</a:t>
-            </a:r>
-            <a:r>
-              <a:rPr lang="en-US" dirty="0" smtClean="0"/>
-              <a:t>);</a:t>
-            </a:r>
-          </a:p>
-          <a:p>
-            <a:pPr marL="381000" indent="-381000">
-              <a:lnSpc>
-                <a:spcPct val="80000"/>
-              </a:lnSpc>
-            </a:pPr>
-            <a:r>
-              <a:rPr lang="en-US" dirty="0" smtClean="0"/>
-              <a:t>		}</a:t>
-            </a:r>
-          </a:p>
-          <a:p>
-            <a:pPr marL="381000" indent="-381000">
-              <a:lnSpc>
-                <a:spcPct val="80000"/>
-              </a:lnSpc>
-            </a:pPr>
-            <a:r>
-              <a:rPr lang="en-US" dirty="0" smtClean="0"/>
-              <a:t>}</a:t>
-            </a:r>
-          </a:p>
-          <a:p>
-            <a:pPr marL="381000" indent="-381000">
-              <a:lnSpc>
-                <a:spcPct val="80000"/>
-              </a:lnSpc>
-            </a:pPr>
-            <a:r>
-              <a:rPr lang="en-US" dirty="0" smtClean="0"/>
-              <a:t>			</a:t>
-            </a:r>
-          </a:p>
-          <a:p>
-            <a:pPr marL="381000" indent="-381000">
-              <a:lnSpc>
-                <a:spcPct val="80000"/>
-              </a:lnSpc>
-            </a:pPr>
-            <a:endParaRPr lang="en-US" dirty="0" smtClean="0"/>
-          </a:p>
-          <a:p>
-            <a:pPr marL="381000" indent="-381000">
-              <a:lnSpc>
-                <a:spcPct val="80000"/>
-              </a:lnSpc>
-            </a:pPr>
-            <a:r>
-              <a:rPr lang="en-US" dirty="0" smtClean="0"/>
-              <a:t>	</a:t>
-            </a:r>
-          </a:p>
-          <a:p>
-            <a:pPr marL="381000" indent="-381000">
-              <a:lnSpc>
-                <a:spcPct val="80000"/>
-              </a:lnSpc>
-            </a:pPr>
-            <a:endParaRPr lang="en-US" dirty="0" smtClean="0"/>
-          </a:p>
-          <a:p>
-            <a:endParaRPr lang="en-US" dirty="0"/>
-          </a:p>
-        </p:txBody>
-      </p:sp>
-    </p:spTree>
-  </p:cSld>
-  <p:clrMapOvr>
-    <a:masterClrMapping/>
-  </p:clrMapOvr>
-</p:sld>
-</file>
-
-<file path=ppt/slides/slide14.xml><?xml version="1.0" encoding="utf-8"?>
-<p:sld xmlns:a="http://schemas.openxmlformats.org/drawingml/2006/main" xmlns:r="http://schemas.openxmlformats.org/officeDocument/2006/relationships" xmlns:mc="http://schemas.openxmlformats.org/markup-compatibility/2006" xmlns:mv="urn:schemas-microsoft-com:mac:vml" xmlns:p="http://schemas.openxmlformats.org/presentationml/2006/main" mc:Ignorable="mv" mc:PreserveAttributes="mv:*">
-  <p:cSld>
-    <p:spTree>
-      <p:nvGrpSpPr>
-        <p:cNvPr id="1" name=""/>
-        <p:cNvGrpSpPr/>
-        <p:nvPr/>
-      </p:nvGrpSpPr>
-      <p:grpSpPr>
-        <a:xfrm>
-          <a:off x="0" y="0"/>
-          <a:ext cx="0" cy="0"/>
-          <a:chOff x="0" y="0"/>
-          <a:chExt cx="0" cy="0"/>
-        </a:xfrm>
-      </p:grpSpPr>
-      <p:sp>
-        <p:nvSpPr>
-          <p:cNvPr id="2" name="Title 1"/>
-          <p:cNvSpPr>
-            <a:spLocks noGrp="1"/>
-          </p:cNvSpPr>
-          <p:nvPr>
-            <p:ph type="title"/>
-          </p:nvPr>
-        </p:nvSpPr>
-        <p:spPr/>
-        <p:txBody>
-          <a:bodyPr/>
-          <a:lstStyle/>
-          <a:p>
-            <a:r>
-              <a:rPr lang="en-US" dirty="0" smtClean="0"/>
-              <a:t>What does a program do?</a:t>
-            </a:r>
-            <a:endParaRPr lang="en-US" dirty="0"/>
-          </a:p>
-        </p:txBody>
-      </p:sp>
-      <p:sp>
-        <p:nvSpPr>
-          <p:cNvPr id="3" name="Content Placeholder 2"/>
-          <p:cNvSpPr>
-            <a:spLocks noGrp="1"/>
-          </p:cNvSpPr>
-          <p:nvPr>
-            <p:ph idx="1"/>
-          </p:nvPr>
-        </p:nvSpPr>
-        <p:spPr/>
-        <p:txBody>
-          <a:bodyPr/>
-          <a:lstStyle/>
-          <a:p>
-            <a:endParaRPr lang="en-US" dirty="0" smtClean="0"/>
-          </a:p>
-          <a:p>
-            <a:endParaRPr lang="en-US" dirty="0" smtClean="0"/>
-          </a:p>
-          <a:p>
-            <a:endParaRPr lang="en-US" dirty="0" smtClean="0"/>
-          </a:p>
-          <a:p>
-            <a:r>
-              <a:rPr lang="en-US" dirty="0" smtClean="0"/>
-              <a:t>1. Takes in data			</a:t>
-            </a:r>
-          </a:p>
-          <a:p>
-            <a:endParaRPr lang="en-US" dirty="0" smtClean="0"/>
-          </a:p>
-          <a:p>
-            <a:r>
-              <a:rPr lang="en-US" dirty="0" smtClean="0"/>
-              <a:t>				</a:t>
-            </a:r>
-            <a:r>
-              <a:rPr lang="en-US" dirty="0" err="1" smtClean="0">
-                <a:latin typeface="Wingdings"/>
-                <a:ea typeface="Wingdings"/>
-                <a:cs typeface="Wingdings"/>
-              </a:rPr>
-              <a:t></a:t>
-            </a:r>
-            <a:endParaRPr lang="en-US" dirty="0" smtClean="0"/>
-          </a:p>
-          <a:p>
-            <a:endParaRPr lang="en-US" dirty="0" smtClean="0"/>
-          </a:p>
-          <a:p>
-            <a:r>
-              <a:rPr lang="en-US" dirty="0" smtClean="0"/>
-              <a:t>2. Manipulates the data 	</a:t>
-            </a:r>
-          </a:p>
-          <a:p>
-            <a:endParaRPr lang="en-US" dirty="0" smtClean="0"/>
-          </a:p>
-          <a:p>
-            <a:r>
-              <a:rPr lang="en-US" dirty="0" smtClean="0"/>
-              <a:t>				</a:t>
-            </a:r>
-            <a:r>
-              <a:rPr lang="en-US" dirty="0" err="1" smtClean="0">
-                <a:latin typeface="Wingdings"/>
-                <a:ea typeface="Wingdings"/>
-                <a:cs typeface="Wingdings"/>
-              </a:rPr>
-              <a:t></a:t>
-            </a:r>
-            <a:endParaRPr lang="en-US" dirty="0" smtClean="0"/>
-          </a:p>
-          <a:p>
-            <a:endParaRPr lang="en-US" dirty="0" smtClean="0"/>
-          </a:p>
-          <a:p>
-            <a:r>
-              <a:rPr lang="en-US" dirty="0" smtClean="0"/>
-              <a:t>3. Sends data out</a:t>
-            </a:r>
-          </a:p>
-          <a:p>
-            <a:endParaRPr lang="en-US" dirty="0" smtClean="0"/>
-          </a:p>
-          <a:p>
-            <a:endParaRPr lang="en-US" dirty="0" smtClean="0"/>
-          </a:p>
-          <a:p>
-            <a:endParaRPr lang="en-US" dirty="0"/>
-          </a:p>
-        </p:txBody>
-      </p:sp>
-    </p:spTree>
-  </p:cSld>
-  <p:clrMapOvr>
-    <a:masterClrMapping/>
-  </p:clrMapOvr>
-  <p:timing>
-    <p:tnLst>
-      <p:par>
-        <p:cTn id="1" dur="indefinite" restart="never" nodeType="tmRoot"/>
-      </p:par>
-    </p:tnLst>
-  </p:timing>
-</p:sld>
-</file>
-
-<file path=ppt/slides/slide15.xml><?xml version="1.0" encoding="utf-8"?>
-<p:sld xmlns:a="http://schemas.openxmlformats.org/drawingml/2006/main" xmlns:r="http://schemas.openxmlformats.org/officeDocument/2006/relationships" xmlns:mc="http://schemas.openxmlformats.org/markup-compatibility/2006" xmlns:mv="urn:schemas-microsoft-com:mac:vml" xmlns:p="http://schemas.openxmlformats.org/presentationml/2006/main" mc:Ignorable="mv" mc:PreserveAttributes="mv:*">
-  <p:cSld>
-    <p:spTree>
-      <p:nvGrpSpPr>
-        <p:cNvPr id="1" name=""/>
-        <p:cNvGrpSpPr/>
-        <p:nvPr/>
-      </p:nvGrpSpPr>
-      <p:grpSpPr>
-        <a:xfrm>
-          <a:off x="0" y="0"/>
-          <a:ext cx="0" cy="0"/>
-          <a:chOff x="0" y="0"/>
-          <a:chExt cx="0" cy="0"/>
-        </a:xfrm>
-      </p:grpSpPr>
-      <p:sp>
-        <p:nvSpPr>
-          <p:cNvPr id="2" name="Title 1"/>
-          <p:cNvSpPr>
-            <a:spLocks noGrp="1"/>
-          </p:cNvSpPr>
-          <p:nvPr>
-            <p:ph type="title"/>
-          </p:nvPr>
-        </p:nvSpPr>
-        <p:spPr/>
-        <p:txBody>
-          <a:bodyPr/>
-          <a:lstStyle/>
-          <a:p>
-            <a:r>
-              <a:rPr lang="en-US" dirty="0" smtClean="0"/>
-              <a:t>Types of inputs</a:t>
-            </a:r>
-            <a:endParaRPr lang="en-US" dirty="0"/>
-          </a:p>
-        </p:txBody>
-      </p:sp>
-      <p:sp>
-        <p:nvSpPr>
-          <p:cNvPr id="3" name="Content Placeholder 2"/>
-          <p:cNvSpPr>
-            <a:spLocks noGrp="1"/>
-          </p:cNvSpPr>
-          <p:nvPr>
-            <p:ph idx="1"/>
-          </p:nvPr>
-        </p:nvSpPr>
-        <p:spPr/>
-        <p:txBody>
-          <a:bodyPr/>
-          <a:lstStyle/>
-          <a:p>
-            <a:endParaRPr lang="en-US" dirty="0" smtClean="0"/>
-          </a:p>
-          <a:p>
-            <a:r>
-              <a:rPr lang="en-US" dirty="0" smtClean="0"/>
-              <a:t>User interaction: mouse, keyboard</a:t>
-            </a:r>
-          </a:p>
-          <a:p>
-            <a:endParaRPr lang="en-US" dirty="0" smtClean="0"/>
-          </a:p>
-          <a:p>
-            <a:r>
-              <a:rPr lang="en-US" dirty="0" smtClean="0"/>
-              <a:t>Multimedia: video camera, microphone, sensors</a:t>
-            </a:r>
-          </a:p>
-          <a:p>
-            <a:endParaRPr lang="en-US" dirty="0" smtClean="0"/>
-          </a:p>
-          <a:p>
-            <a:r>
-              <a:rPr lang="en-US" dirty="0" smtClean="0"/>
-              <a:t>Control messages: instructions from another program</a:t>
-            </a:r>
-          </a:p>
-          <a:p>
-            <a:endParaRPr lang="en-US" dirty="0" smtClean="0"/>
-          </a:p>
-          <a:p>
-            <a:r>
-              <a:rPr lang="en-US" dirty="0" smtClean="0"/>
-              <a:t>Network data: IP packets, UDP </a:t>
-            </a:r>
-            <a:r>
-              <a:rPr lang="en-US" dirty="0" err="1" smtClean="0"/>
-              <a:t>datagrams</a:t>
-            </a:r>
-            <a:endParaRPr lang="en-US" dirty="0" smtClean="0"/>
-          </a:p>
-          <a:p>
-            <a:endParaRPr lang="en-US" dirty="0" smtClean="0"/>
-          </a:p>
-          <a:p>
-            <a:r>
-              <a:rPr lang="en-US" dirty="0" smtClean="0"/>
-              <a:t>Stored data: information stored in databases, files, spreadsheets</a:t>
-            </a:r>
-          </a:p>
-          <a:p>
-            <a:endParaRPr lang="en-US" dirty="0" smtClean="0"/>
-          </a:p>
-          <a:p>
-            <a:r>
-              <a:rPr lang="en-US" dirty="0" smtClean="0"/>
-              <a:t>Real-time data: RSS feeds, market data</a:t>
-            </a:r>
-          </a:p>
-          <a:p>
-            <a:endParaRPr lang="en-US" dirty="0"/>
-          </a:p>
-          <a:p>
-            <a:endParaRPr lang="en-US" dirty="0" smtClean="0"/>
-          </a:p>
-          <a:p>
-            <a:r>
-              <a:rPr lang="en-US" dirty="0" smtClean="0"/>
-              <a:t> </a:t>
-            </a:r>
-          </a:p>
-          <a:p>
-            <a:endParaRPr lang="en-US" dirty="0" smtClean="0"/>
-          </a:p>
-          <a:p>
-            <a:endParaRPr lang="en-US" dirty="0"/>
-          </a:p>
-        </p:txBody>
-      </p:sp>
-    </p:spTree>
-  </p:cSld>
-  <p:clrMapOvr>
-    <a:masterClrMapping/>
-  </p:clrMapOvr>
-  <p:timing>
-    <p:tnLst>
-      <p:par>
-        <p:cTn id="1" dur="indefinite" restart="never" nodeType="tmRoot"/>
-      </p:par>
-    </p:tnLst>
-  </p:timing>
-</p:sld>
-</file>
-
-<file path=ppt/slides/slide16.xml><?xml version="1.0" encoding="utf-8"?>
-<p:sld xmlns:a="http://schemas.openxmlformats.org/drawingml/2006/main" xmlns:r="http://schemas.openxmlformats.org/officeDocument/2006/relationships" xmlns:mc="http://schemas.openxmlformats.org/markup-compatibility/2006" xmlns:mv="urn:schemas-microsoft-com:mac:vml" xmlns:p="http://schemas.openxmlformats.org/presentationml/2006/main" mc:Ignorable="mv" mc:PreserveAttributes="mv:*">
-  <p:cSld>
-    <p:spTree>
-      <p:nvGrpSpPr>
-        <p:cNvPr id="1" name=""/>
-        <p:cNvGrpSpPr/>
-        <p:nvPr/>
-      </p:nvGrpSpPr>
-      <p:grpSpPr>
-        <a:xfrm>
-          <a:off x="0" y="0"/>
-          <a:ext cx="0" cy="0"/>
-          <a:chOff x="0" y="0"/>
-          <a:chExt cx="0" cy="0"/>
-        </a:xfrm>
-      </p:grpSpPr>
-      <p:sp>
-        <p:nvSpPr>
-          <p:cNvPr id="2" name="Title 1"/>
-          <p:cNvSpPr>
-            <a:spLocks noGrp="1"/>
-          </p:cNvSpPr>
-          <p:nvPr>
-            <p:ph type="title"/>
-          </p:nvPr>
-        </p:nvSpPr>
-        <p:spPr/>
-        <p:txBody>
-          <a:bodyPr/>
-          <a:lstStyle/>
-          <a:p>
-            <a:r>
-              <a:rPr lang="en-US" dirty="0" smtClean="0"/>
-              <a:t>Types of manipulation</a:t>
-            </a:r>
-            <a:endParaRPr lang="en-US" dirty="0"/>
-          </a:p>
-        </p:txBody>
-      </p:sp>
-      <p:sp>
-        <p:nvSpPr>
-          <p:cNvPr id="3" name="Content Placeholder 2"/>
-          <p:cNvSpPr>
-            <a:spLocks noGrp="1"/>
-          </p:cNvSpPr>
-          <p:nvPr>
-            <p:ph idx="1"/>
-          </p:nvPr>
-        </p:nvSpPr>
-        <p:spPr/>
-        <p:txBody>
-          <a:bodyPr/>
-          <a:lstStyle/>
-          <a:p>
-            <a:endParaRPr lang="en-US" dirty="0" smtClean="0"/>
-          </a:p>
-          <a:p>
-            <a:r>
-              <a:rPr lang="en-US" dirty="0"/>
-              <a:t>F</a:t>
-            </a:r>
-            <a:r>
-              <a:rPr lang="en-US" dirty="0" smtClean="0"/>
-              <a:t>iltering data - removing unimportant stuff</a:t>
-            </a:r>
-          </a:p>
-          <a:p>
-            <a:endParaRPr lang="en-US" dirty="0" smtClean="0"/>
-          </a:p>
-          <a:p>
-            <a:r>
-              <a:rPr lang="en-US" dirty="0"/>
-              <a:t>R</a:t>
-            </a:r>
-            <a:r>
-              <a:rPr lang="en-US" dirty="0" smtClean="0"/>
-              <a:t>earranging data - sorting data into more and less important stuff</a:t>
-            </a:r>
-          </a:p>
-          <a:p>
-            <a:endParaRPr lang="en-US" dirty="0" smtClean="0"/>
-          </a:p>
-          <a:p>
-            <a:r>
-              <a:rPr lang="en-US" dirty="0"/>
-              <a:t>S</a:t>
-            </a:r>
-            <a:r>
-              <a:rPr lang="en-US" dirty="0" smtClean="0"/>
-              <a:t>egmenting data - placing data into various categories</a:t>
-            </a:r>
-          </a:p>
-          <a:p>
-            <a:endParaRPr lang="en-US" dirty="0" smtClean="0"/>
-          </a:p>
-          <a:p>
-            <a:r>
-              <a:rPr lang="en-US" dirty="0"/>
-              <a:t>T</a:t>
-            </a:r>
-            <a:r>
-              <a:rPr lang="en-US" dirty="0" smtClean="0"/>
-              <a:t>ransforming data - applying rules to input data to turn it to new data</a:t>
-            </a:r>
-          </a:p>
-          <a:p>
-            <a:endParaRPr lang="en-US" dirty="0" smtClean="0"/>
-          </a:p>
-          <a:p>
-            <a:endParaRPr lang="en-US" dirty="0" smtClean="0"/>
-          </a:p>
-          <a:p>
-            <a:r>
-              <a:rPr lang="en-US" dirty="0" smtClean="0"/>
-              <a:t>In very general computer science terms:</a:t>
-            </a:r>
-          </a:p>
-          <a:p>
-            <a:endParaRPr lang="en-US" dirty="0" smtClean="0"/>
-          </a:p>
-          <a:p>
-            <a:r>
-              <a:rPr lang="en-US" dirty="0" smtClean="0"/>
-              <a:t>first, you place the input data into appropriate data structures...</a:t>
-            </a:r>
-          </a:p>
-          <a:p>
-            <a:r>
-              <a:rPr lang="en-US" dirty="0" smtClean="0"/>
-              <a:t>...and then manipulate the data using appropriate algorithms</a:t>
-            </a:r>
-          </a:p>
-          <a:p>
-            <a:endParaRPr lang="en-US" dirty="0" smtClean="0"/>
-          </a:p>
-          <a:p>
-            <a:endParaRPr lang="en-US" dirty="0" smtClean="0"/>
-          </a:p>
-          <a:p>
-            <a:r>
-              <a:rPr lang="en-US" i="1" dirty="0" smtClean="0"/>
-              <a:t>data structure : noun :: algorithm : verb</a:t>
-            </a:r>
-          </a:p>
-          <a:p>
-            <a:endParaRPr lang="en-US" dirty="0" smtClean="0"/>
-          </a:p>
-          <a:p>
-            <a:r>
-              <a:rPr lang="en-US" dirty="0" smtClean="0"/>
-              <a:t>"my program uses the </a:t>
-            </a:r>
-            <a:r>
-              <a:rPr lang="en-US" dirty="0" err="1" smtClean="0"/>
-              <a:t>quicksort</a:t>
-            </a:r>
-            <a:r>
-              <a:rPr lang="en-US" dirty="0" smtClean="0"/>
-              <a:t> algorithm to rearrange the linked list"</a:t>
-            </a:r>
-          </a:p>
-          <a:p>
-            <a:r>
-              <a:rPr lang="en-US" dirty="0" smtClean="0"/>
-              <a:t>"my program uses a low pass filter to attenuate high-frequencies in my ring buffer"</a:t>
-            </a:r>
-          </a:p>
-          <a:p>
-            <a:endParaRPr lang="en-US" dirty="0" smtClean="0"/>
-          </a:p>
-          <a:p>
-            <a:endParaRPr lang="en-US" dirty="0" smtClean="0"/>
-          </a:p>
-          <a:p>
-            <a:endParaRPr lang="en-US" dirty="0"/>
-          </a:p>
-          <a:p>
-            <a:endParaRPr lang="en-US" dirty="0" smtClean="0"/>
-          </a:p>
-          <a:p>
-            <a:endParaRPr lang="en-US" dirty="0"/>
-          </a:p>
-          <a:p>
-            <a:endParaRPr lang="en-US" dirty="0" smtClean="0"/>
-          </a:p>
-          <a:p>
-            <a:endParaRPr lang="en-US" dirty="0" smtClean="0"/>
-          </a:p>
-          <a:p>
-            <a:endParaRPr lang="en-US" dirty="0" smtClean="0"/>
-          </a:p>
-          <a:p>
-            <a:endParaRPr lang="en-US" dirty="0" smtClean="0"/>
-          </a:p>
-          <a:p>
-            <a:endParaRPr lang="en-US" dirty="0" smtClean="0"/>
-          </a:p>
-          <a:p>
-            <a:endParaRPr lang="en-US" dirty="0"/>
           </a:p>
         </p:txBody>
       </p:sp>
@@ -6116,7 +3965,7 @@
           <a:p>
             <a:r>
               <a:rPr lang="en-US" dirty="0" smtClean="0"/>
-              <a:t>Object-oriented</a:t>
+              <a:t>Final Projects</a:t>
             </a:r>
             <a:endParaRPr lang="en-US" dirty="0"/>
           </a:p>
@@ -6140,106 +3989,152 @@
             <a:endParaRPr lang="en-US" dirty="0" smtClean="0"/>
           </a:p>
           <a:p>
-            <a:r>
-              <a:rPr lang="en-US" b="1" dirty="0" smtClean="0"/>
-              <a:t>What does Object-oriented mean?</a:t>
-            </a:r>
-          </a:p>
-          <a:p>
             <a:endParaRPr lang="en-US" dirty="0" smtClean="0"/>
           </a:p>
           <a:p>
-            <a:pPr marL="0" indent="0">
-              <a:lnSpc>
-                <a:spcPct val="80000"/>
-              </a:lnSpc>
-            </a:pPr>
-            <a:r>
-              <a:rPr lang="en-US" dirty="0" smtClean="0"/>
-              <a:t>"Object-oriented" means that you can write little groups of code which mimic objects or processes in the real world. </a:t>
-            </a:r>
-          </a:p>
-          <a:p>
-            <a:pPr marL="0" indent="0">
-              <a:lnSpc>
-                <a:spcPct val="80000"/>
-              </a:lnSpc>
-            </a:pPr>
+            <a:r>
+              <a:rPr lang="en-US" dirty="0" smtClean="0"/>
+              <a:t>1. </a:t>
+            </a:r>
+            <a:r>
+              <a:rPr lang="en-US" dirty="0" smtClean="0"/>
+              <a:t>Algorithms</a:t>
+            </a:r>
+            <a:r>
+              <a:rPr lang="en-US" dirty="0" smtClean="0"/>
+              <a:t> Project &amp; Competition</a:t>
+            </a:r>
+          </a:p>
+          <a:p>
+            <a:r>
+              <a:rPr lang="en-US" dirty="0" smtClean="0"/>
+              <a:t>	- Build an interactive implementation of the the Set Daily Puzzle. </a:t>
+            </a:r>
+          </a:p>
+          <a:p>
+            <a:r>
+              <a:rPr lang="en-US" dirty="0" smtClean="0"/>
+              <a:t>			(</a:t>
+            </a:r>
+            <a:r>
+              <a:rPr lang="en-US" dirty="0" smtClean="0"/>
+              <a:t>http://</a:t>
+            </a:r>
+            <a:r>
+              <a:rPr lang="en-US" dirty="0" err="1" smtClean="0"/>
+              <a:t>www.setgame.com/set/</a:t>
+            </a:r>
+            <a:r>
+              <a:rPr lang="en-US" dirty="0" err="1" smtClean="0"/>
+              <a:t>puzzle_frame.htm</a:t>
+            </a:r>
+            <a:r>
+              <a:rPr lang="en-US" dirty="0" smtClean="0"/>
+              <a:t>) </a:t>
+            </a:r>
+          </a:p>
+          <a:p>
+            <a:r>
+              <a:rPr lang="en-US" dirty="0" smtClean="0"/>
+              <a:t>	- Create an algorithm to solve the puzzle in the shortest number of steps.</a:t>
+            </a:r>
+          </a:p>
+          <a:p>
+            <a:r>
+              <a:rPr lang="en-US" dirty="0" smtClean="0"/>
+              <a:t>	- On competition day, all implementations will be given the same game data. The</a:t>
+            </a:r>
+          </a:p>
+          <a:p>
+            <a:r>
+              <a:rPr lang="en-US" dirty="0" smtClean="0"/>
+              <a:t>			program that solves it in the least number of steps will be the winner.</a:t>
+            </a:r>
+          </a:p>
+          <a:p>
+            <a:r>
+              <a:rPr lang="en-US" dirty="0" smtClean="0"/>
+              <a:t>	- Grading will be as follows: 50% competition; 25% elegance/cleverness of algorithm &amp;</a:t>
+            </a:r>
+          </a:p>
+          <a:p>
+            <a:r>
+              <a:rPr lang="en-US" dirty="0" smtClean="0"/>
+              <a:t>			data structures; 25% visuals/interaction</a:t>
+            </a:r>
+          </a:p>
+          <a:p>
             <a:endParaRPr lang="en-US" dirty="0" smtClean="0"/>
           </a:p>
           <a:p>
-            <a:pPr marL="0" indent="0">
-              <a:lnSpc>
-                <a:spcPct val="80000"/>
-              </a:lnSpc>
-            </a:pPr>
-            <a:r>
-              <a:rPr lang="en-US" dirty="0" smtClean="0"/>
-              <a:t>Every program builds a certain model of the world where objects in that world interact.</a:t>
-            </a:r>
-          </a:p>
-          <a:p>
-            <a:pPr marL="0" indent="0">
-              <a:lnSpc>
-                <a:spcPct val="80000"/>
-              </a:lnSpc>
-            </a:pPr>
-            <a:endParaRPr lang="en-US" dirty="0" smtClean="0"/>
-          </a:p>
-          <a:p>
-            <a:pPr marL="0" indent="0">
-              <a:lnSpc>
-                <a:spcPct val="80000"/>
-              </a:lnSpc>
-            </a:pPr>
-            <a:r>
-              <a:rPr lang="en-US" dirty="0" smtClean="0"/>
-              <a:t>Makes it easy to reuse code. You can create lots of different versions of that same object, but with different attributes. </a:t>
-            </a:r>
-          </a:p>
-          <a:p>
-            <a:pPr marL="0" indent="0">
-              <a:lnSpc>
-                <a:spcPct val="80000"/>
-              </a:lnSpc>
-            </a:pPr>
-            <a:endParaRPr lang="en-US" dirty="0" smtClean="0"/>
-          </a:p>
-          <a:p>
-            <a:pPr marL="0" indent="0">
-              <a:lnSpc>
-                <a:spcPct val="80000"/>
-              </a:lnSpc>
-            </a:pPr>
-            <a:r>
-              <a:rPr lang="en-US" dirty="0" smtClean="0"/>
-              <a:t>If you think of an object as a Noun, you can use different Adjectives to describe it.</a:t>
-            </a:r>
-          </a:p>
-          <a:p>
-            <a:pPr marL="0" indent="0">
-              <a:lnSpc>
-                <a:spcPct val="80000"/>
-              </a:lnSpc>
-            </a:pPr>
-            <a:endParaRPr lang="en-US" dirty="0" smtClean="0"/>
-          </a:p>
-          <a:p>
-            <a:pPr marL="0" indent="0">
-              <a:lnSpc>
-                <a:spcPct val="80000"/>
-              </a:lnSpc>
-            </a:pPr>
-            <a:r>
-              <a:rPr lang="en-US" dirty="0" smtClean="0"/>
-              <a:t>Object-oriented code helps you set-up a model of the world which is similar to the way humans think of it.</a:t>
-            </a:r>
-            <a:endParaRPr lang="en-US" sz="1000" dirty="0" smtClean="0"/>
-          </a:p>
-          <a:p>
-            <a:endParaRPr lang="en-US" dirty="0" smtClean="0"/>
-          </a:p>
-          <a:p>
+            <a:r>
+              <a:rPr lang="en-US" dirty="0" smtClean="0"/>
+              <a:t>2. Final Research Project &amp; Implementation</a:t>
+            </a:r>
+          </a:p>
+          <a:p>
+            <a:r>
+              <a:rPr lang="en-US" dirty="0" smtClean="0"/>
+              <a:t>	- Choose a project of your choice that utilizes media data in some shape or form 		(e.g. OpenGL, </a:t>
+            </a:r>
+            <a:r>
+              <a:rPr lang="en-US" dirty="0" err="1" smtClean="0"/>
+              <a:t>OpenCV</a:t>
+            </a:r>
+            <a:r>
+              <a:rPr lang="en-US" dirty="0" smtClean="0"/>
+              <a:t>, </a:t>
+            </a:r>
+            <a:r>
+              <a:rPr lang="en-US" dirty="0" err="1" smtClean="0"/>
+              <a:t>PortAudio</a:t>
+            </a:r>
+            <a:r>
+              <a:rPr lang="en-US" dirty="0" smtClean="0"/>
+              <a:t>, etc) using the language of your choice (C/C++,</a:t>
+            </a:r>
+          </a:p>
+          <a:p>
+            <a:r>
+              <a:rPr lang="en-US" dirty="0" smtClean="0"/>
+              <a:t>			Processing, Java, etc).   </a:t>
+            </a:r>
+            <a:r>
+              <a:rPr lang="en-US" dirty="0" smtClean="0"/>
+              <a:t> </a:t>
+            </a:r>
+          </a:p>
+          <a:p>
+            <a:r>
+              <a:rPr lang="en-US" dirty="0" smtClean="0"/>
+              <a:t>	- You will give two presentations: 1) a quick "flash forward" </a:t>
+            </a:r>
+            <a:r>
+              <a:rPr lang="en-US" dirty="0" smtClean="0"/>
+              <a:t>1</a:t>
+            </a:r>
+            <a:r>
+              <a:rPr lang="en-US" dirty="0" smtClean="0"/>
+              <a:t> minute overview of</a:t>
+            </a:r>
+          </a:p>
+          <a:p>
+            <a:r>
+              <a:rPr lang="en-US" dirty="0" smtClean="0"/>
+              <a:t>			 your project, describing the overall direction &amp; innovation of the project; and</a:t>
+            </a:r>
+          </a:p>
+          <a:p>
+            <a:r>
+              <a:rPr lang="en-US" dirty="0" smtClean="0"/>
+              <a:t>			 then 2) a final 15 minute presentation demonstrating the project.</a:t>
+            </a:r>
+          </a:p>
+          <a:p>
+            <a:r>
+              <a:rPr lang="en-US" dirty="0" smtClean="0"/>
+              <a:t>	- You will also need to create a website describing your final project.  </a:t>
+            </a:r>
             <a:endParaRPr lang="en-US" dirty="0" smtClean="0"/>
           </a:p>
           <a:p>
@@ -6299,7 +4194,7 @@
           <a:p>
             <a:r>
               <a:rPr lang="en-US" dirty="0" smtClean="0"/>
-              <a:t>Object-oriented</a:t>
+              <a:t>Research Project &amp; Implementation</a:t>
             </a:r>
             <a:endParaRPr lang="en-US" dirty="0"/>
           </a:p>
@@ -6323,207 +4218,68 @@
             <a:endParaRPr lang="en-US" dirty="0" smtClean="0"/>
           </a:p>
           <a:p>
-            <a:pPr marL="0" indent="0">
-              <a:lnSpc>
-                <a:spcPct val="80000"/>
-              </a:lnSpc>
-            </a:pPr>
-            <a:r>
-              <a:rPr lang="en-US" dirty="0" smtClean="0"/>
-              <a:t>You can think of programming in these two ways:</a:t>
-            </a:r>
-          </a:p>
-          <a:p>
-            <a:pPr marL="0" indent="0">
-              <a:lnSpc>
-                <a:spcPct val="80000"/>
-              </a:lnSpc>
-            </a:pPr>
+            <a:r>
+              <a:rPr lang="en-US" dirty="0" smtClean="0"/>
+              <a:t>Research = Pushing the proverbial envelope...</a:t>
+            </a:r>
+          </a:p>
+          <a:p>
             <a:endParaRPr lang="en-US" dirty="0" smtClean="0"/>
           </a:p>
           <a:p>
-            <a:pPr marL="0" indent="0">
-              <a:lnSpc>
-                <a:spcPct val="80000"/>
-              </a:lnSpc>
-            </a:pPr>
-            <a:r>
-              <a:rPr lang="en-US" dirty="0" smtClean="0"/>
-              <a:t>a) As a set of extremely detailed instructions.</a:t>
-            </a:r>
-          </a:p>
-          <a:p>
-            <a:pPr marL="0" indent="0">
-              <a:lnSpc>
-                <a:spcPct val="80000"/>
-              </a:lnSpc>
-            </a:pPr>
+            <a:r>
+              <a:rPr lang="en-US" dirty="0" smtClean="0"/>
+              <a:t>This should be exciting, novel, clever, inspiring on one or more levels...</a:t>
+            </a:r>
+          </a:p>
+          <a:p>
             <a:endParaRPr lang="en-US" dirty="0" smtClean="0"/>
           </a:p>
           <a:p>
-            <a:pPr marL="0" indent="0">
-              <a:lnSpc>
-                <a:spcPct val="80000"/>
-              </a:lnSpc>
-            </a:pPr>
-            <a:r>
-              <a:rPr lang="en-US" dirty="0" err="1" smtClean="0"/>
-              <a:t>b</a:t>
-            </a:r>
-            <a:r>
-              <a:rPr lang="en-US" dirty="0" smtClean="0"/>
-              <a:t>) As a set of simplified models of certain objects or processes in the world.</a:t>
-            </a:r>
-          </a:p>
-          <a:p>
-            <a:pPr marL="0" indent="0">
-              <a:lnSpc>
-                <a:spcPct val="80000"/>
-              </a:lnSpc>
-            </a:pPr>
+            <a:r>
+              <a:rPr lang="en-US" dirty="0" smtClean="0"/>
+              <a:t>1) Describe the envelope...</a:t>
+            </a:r>
+          </a:p>
+          <a:p>
+            <a:r>
+              <a:rPr lang="en-US" dirty="0" smtClean="0"/>
+              <a:t>		What is the overall context? What other work has been done in this area? Why is it important? How is different from other approaches?</a:t>
+            </a:r>
+          </a:p>
+          <a:p>
             <a:endParaRPr lang="en-US" dirty="0" smtClean="0"/>
           </a:p>
           <a:p>
-            <a:pPr marL="0" indent="0">
-              <a:lnSpc>
-                <a:spcPct val="80000"/>
-              </a:lnSpc>
-            </a:pPr>
-            <a:r>
-              <a:rPr lang="en-US" dirty="0" smtClean="0"/>
-              <a:t>They go hand-in-hand: All instructions imply a model of the world. All models of the world imply a set of objects that have attributes and behaviors (that have the potential to be instructed).</a:t>
-            </a:r>
-          </a:p>
-          <a:p>
-            <a:pPr marL="0" indent="0">
-              <a:lnSpc>
-                <a:spcPct val="80000"/>
-              </a:lnSpc>
-            </a:pPr>
-            <a:endParaRPr lang="en-US" dirty="0" smtClean="0"/>
-          </a:p>
-          <a:p>
-            <a:pPr marL="0" indent="0">
-              <a:lnSpc>
-                <a:spcPct val="80000"/>
-              </a:lnSpc>
-            </a:pPr>
-            <a:r>
-              <a:rPr lang="en-US" dirty="0" smtClean="0"/>
-              <a:t>Instructions are the “technical” part of programming. Modeling is the conceptual or “creative” part of programming.</a:t>
-            </a:r>
-          </a:p>
-          <a:p>
-            <a:pPr marL="0" indent="0">
-              <a:lnSpc>
-                <a:spcPct val="80000"/>
-              </a:lnSpc>
-            </a:pPr>
-            <a:endParaRPr lang="en-US" dirty="0" smtClean="0"/>
-          </a:p>
-          <a:p>
-            <a:pPr marL="0" indent="0">
-              <a:lnSpc>
-                <a:spcPct val="80000"/>
-              </a:lnSpc>
-            </a:pPr>
-            <a:endParaRPr lang="en-US" dirty="0" smtClean="0"/>
-          </a:p>
-          <a:p>
-            <a:pPr marL="0" indent="0">
-              <a:lnSpc>
-                <a:spcPct val="80000"/>
-              </a:lnSpc>
-            </a:pPr>
-            <a:endParaRPr lang="en-US" dirty="0" smtClean="0"/>
-          </a:p>
-          <a:p>
-            <a:pPr marL="0" indent="0">
-              <a:lnSpc>
-                <a:spcPct val="80000"/>
-              </a:lnSpc>
-            </a:pPr>
-            <a:r>
-              <a:rPr lang="en-US" dirty="0" smtClean="0"/>
-              <a:t>Writing software is really an art as much as it is a science. </a:t>
-            </a:r>
-          </a:p>
-          <a:p>
-            <a:pPr marL="0" indent="0">
-              <a:lnSpc>
-                <a:spcPct val="80000"/>
-              </a:lnSpc>
-            </a:pPr>
-            <a:endParaRPr lang="en-US" dirty="0" smtClean="0"/>
-          </a:p>
-          <a:p>
-            <a:pPr marL="0" indent="0">
-              <a:lnSpc>
-                <a:spcPct val="80000"/>
-              </a:lnSpc>
-            </a:pPr>
-            <a:r>
-              <a:rPr lang="en-US" dirty="0" smtClean="0"/>
-              <a:t>You have to be creative, flexible, able to approach things from different ways.</a:t>
-            </a:r>
-          </a:p>
-          <a:p>
-            <a:pPr marL="0" indent="0">
-              <a:lnSpc>
-                <a:spcPct val="80000"/>
-              </a:lnSpc>
-            </a:pPr>
-            <a:endParaRPr lang="en-US" dirty="0" smtClean="0"/>
-          </a:p>
-          <a:p>
-            <a:pPr marL="0" indent="0">
-              <a:lnSpc>
-                <a:spcPct val="80000"/>
-              </a:lnSpc>
-            </a:pPr>
-            <a:r>
-              <a:rPr lang="en-US" dirty="0" smtClean="0"/>
-              <a:t>You get to create metaphors of reality.</a:t>
-            </a:r>
-          </a:p>
-          <a:p>
-            <a:pPr marL="0" indent="0">
-              <a:lnSpc>
-                <a:spcPct val="80000"/>
-              </a:lnSpc>
-            </a:pPr>
-            <a:endParaRPr lang="en-US" dirty="0" smtClean="0"/>
-          </a:p>
-          <a:p>
-            <a:pPr marL="0" indent="0">
-              <a:lnSpc>
-                <a:spcPct val="80000"/>
-              </a:lnSpc>
-            </a:pPr>
-            <a:r>
-              <a:rPr lang="en-US" dirty="0" smtClean="0"/>
-              <a:t>You get to come up with tricky ways to write instructions efficiently and “elegantly”. </a:t>
-            </a:r>
-          </a:p>
-          <a:p>
-            <a:pPr marL="0" indent="0">
-              <a:lnSpc>
-                <a:spcPct val="80000"/>
-              </a:lnSpc>
-            </a:pPr>
-            <a:endParaRPr lang="en-US" dirty="0" smtClean="0"/>
-          </a:p>
-          <a:p>
-            <a:endParaRPr lang="en-US" dirty="0" smtClean="0"/>
-          </a:p>
-          <a:p>
-            <a:endParaRPr lang="en-US" dirty="0" smtClean="0"/>
-          </a:p>
-          <a:p>
-            <a:endParaRPr lang="en-US" dirty="0" smtClean="0"/>
-          </a:p>
-          <a:p>
-            <a:endParaRPr lang="en-US" dirty="0" smtClean="0"/>
+            <a:r>
+              <a:rPr lang="en-US" dirty="0" smtClean="0"/>
+              <a:t>2) Describe how you are pushing the envelope... </a:t>
+            </a:r>
+          </a:p>
+          <a:p>
+            <a:r>
+              <a:rPr lang="en-US" dirty="0" smtClean="0"/>
+              <a:t>		What is your concept/idea/innovation? What techniques did you utilize in order to  achieve/realize this (programming, algorithm, tools, etc)? What representation (artistic, mathematic, statistic, interactive) did you decide upon? What were the "design decisions" that influenced your project? </a:t>
+            </a:r>
+          </a:p>
+          <a:p>
+            <a:r>
+              <a:rPr lang="en-US" dirty="0" smtClean="0"/>
+              <a:t>	</a:t>
+            </a:r>
+          </a:p>
+          <a:p>
+            <a:r>
+              <a:rPr lang="en-US" dirty="0" smtClean="0"/>
+              <a:t>3) Evaluate the results of your pushing the envelope...</a:t>
+            </a:r>
+          </a:p>
+          <a:p>
+            <a:r>
+              <a:rPr lang="en-US" dirty="0" smtClean="0"/>
+              <a:t>		What happened? What do you think about it? What did people other people think? What were your methods to evaluate what they thought? What future work is there to do? </a:t>
+            </a:r>
+            <a:endParaRPr lang="en-US" dirty="0"/>
           </a:p>
         </p:txBody>
       </p:sp>
@@ -6532,13 +4288,6 @@
   <p:clrMapOvr>
     <a:masterClrMapping/>
   </p:clrMapOvr>
-  <p:timing>
-    <p:tnLst>
-      <p:par>
-        <p:cTn id="1" dur="indefinite" restart="never" nodeType="tmRoot"/>
-      </p:par>
-    </p:tnLst>
-  </p:timing>
 </p:sld>
 </file>
 
@@ -6576,7 +4325,7 @@
           <a:p>
             <a:r>
               <a:rPr lang="en-US" dirty="0" smtClean="0"/>
-              <a:t>Modeling</a:t>
+              <a:t>What does a program do?</a:t>
             </a:r>
             <a:endParaRPr lang="en-US" dirty="0"/>
           </a:p>
@@ -6600,214 +4349,79 @@
             <a:endParaRPr lang="en-US" dirty="0" smtClean="0"/>
           </a:p>
           <a:p>
-            <a:pPr marL="0" indent="0"/>
-            <a:r>
-              <a:rPr lang="en-US" dirty="0" smtClean="0"/>
-              <a:t>“Everything should be made as simple as possible, but no simpler.” </a:t>
-            </a:r>
-          </a:p>
-          <a:p>
-            <a:pPr marL="0" indent="0"/>
-            <a:r>
-              <a:rPr lang="en-US" i="1" dirty="0" smtClean="0"/>
-              <a:t>	-Albert Einstein</a:t>
-            </a:r>
-          </a:p>
-          <a:p>
-            <a:pPr marL="0" indent="0">
-              <a:lnSpc>
-                <a:spcPct val="80000"/>
-              </a:lnSpc>
-            </a:pPr>
             <a:endParaRPr lang="en-US" dirty="0" smtClean="0"/>
           </a:p>
           <a:p>
-            <a:pPr marL="0" indent="0">
-              <a:lnSpc>
-                <a:spcPct val="80000"/>
-              </a:lnSpc>
-            </a:pPr>
             <a:endParaRPr lang="en-US" dirty="0" smtClean="0"/>
           </a:p>
           <a:p>
-            <a:pPr marL="0" indent="0">
-              <a:lnSpc>
-                <a:spcPct val="80000"/>
-              </a:lnSpc>
-            </a:pPr>
-            <a:r>
-              <a:rPr lang="en-US" dirty="0" smtClean="0"/>
-              <a:t>“I have a map of the United States... Actual size. It says, ‘Scale: 1 mile = 1 mile.’ I spent last summer folding it.” </a:t>
-            </a:r>
-          </a:p>
-          <a:p>
-            <a:pPr marL="0" indent="0">
-              <a:lnSpc>
-                <a:spcPct val="80000"/>
-              </a:lnSpc>
-            </a:pPr>
-            <a:r>
-              <a:rPr lang="en-US" i="1" dirty="0" smtClean="0"/>
-              <a:t>	-Stephen Wright</a:t>
-            </a:r>
-          </a:p>
-          <a:p>
-            <a:pPr marL="0" indent="0">
-              <a:lnSpc>
-                <a:spcPct val="80000"/>
-              </a:lnSpc>
-            </a:pPr>
+            <a:r>
+              <a:rPr lang="en-US" dirty="0" smtClean="0"/>
+              <a:t>1. Takes in data			</a:t>
+            </a:r>
+          </a:p>
+          <a:p>
             <a:endParaRPr lang="en-US" dirty="0" smtClean="0"/>
           </a:p>
           <a:p>
-            <a:pPr marL="0" indent="0">
-              <a:lnSpc>
-                <a:spcPct val="90000"/>
-              </a:lnSpc>
-            </a:pPr>
+            <a:r>
+              <a:rPr lang="en-US" dirty="0" smtClean="0"/>
+              <a:t>				</a:t>
+            </a:r>
+            <a:r>
+              <a:rPr lang="en-US" dirty="0" err="1" smtClean="0">
+                <a:latin typeface="Wingdings"/>
+                <a:ea typeface="Wingdings"/>
+                <a:cs typeface="Wingdings"/>
+              </a:rPr>
+              <a:t></a:t>
+            </a:r>
             <a:endParaRPr lang="en-US" dirty="0" smtClean="0"/>
           </a:p>
           <a:p>
-            <a:pPr marL="0" indent="0">
-              <a:lnSpc>
-                <a:spcPct val="90000"/>
-              </a:lnSpc>
-            </a:pPr>
-            <a:r>
-              <a:rPr lang="en-US" dirty="0" smtClean="0"/>
-              <a:t>The whole point of a model is that it doesn't include everything. It is a vastly simplified version of reality, which is exactly why it's useful. </a:t>
-            </a:r>
-          </a:p>
-          <a:p>
-            <a:pPr marL="0" indent="0">
-              <a:lnSpc>
-                <a:spcPct val="90000"/>
-              </a:lnSpc>
-            </a:pPr>
             <a:endParaRPr lang="en-US" dirty="0" smtClean="0"/>
           </a:p>
           <a:p>
-            <a:pPr marL="0" indent="0">
-              <a:lnSpc>
-                <a:spcPct val="90000"/>
-              </a:lnSpc>
-            </a:pPr>
-            <a:r>
-              <a:rPr lang="en-US" dirty="0" smtClean="0"/>
-              <a:t>To make a model of something means you have to leave most stuff out.</a:t>
-            </a:r>
-          </a:p>
-          <a:p>
-            <a:pPr marL="0" indent="0">
-              <a:lnSpc>
-                <a:spcPct val="90000"/>
-              </a:lnSpc>
-            </a:pPr>
+            <a:r>
+              <a:rPr lang="en-US" dirty="0" smtClean="0"/>
+              <a:t>2. Manipulates the data 	</a:t>
+            </a:r>
+          </a:p>
+          <a:p>
             <a:endParaRPr lang="en-US" dirty="0" smtClean="0"/>
           </a:p>
           <a:p>
-            <a:pPr marL="0" indent="0">
-              <a:lnSpc>
-                <a:spcPct val="90000"/>
-              </a:lnSpc>
-            </a:pPr>
-            <a:r>
-              <a:rPr lang="en-US" dirty="0" smtClean="0"/>
-              <a:t>Here's a map (on next slide):</a:t>
-            </a:r>
-          </a:p>
-          <a:p>
-            <a:pPr marL="0" indent="0">
-              <a:lnSpc>
-                <a:spcPct val="90000"/>
-              </a:lnSpc>
-            </a:pPr>
+            <a:r>
+              <a:rPr lang="en-US" dirty="0" smtClean="0"/>
+              <a:t>				</a:t>
+            </a:r>
+            <a:r>
+              <a:rPr lang="en-US" dirty="0" err="1" smtClean="0">
+                <a:latin typeface="Wingdings"/>
+                <a:ea typeface="Wingdings"/>
+                <a:cs typeface="Wingdings"/>
+              </a:rPr>
+              <a:t></a:t>
+            </a:r>
             <a:endParaRPr lang="en-US" dirty="0" smtClean="0"/>
           </a:p>
           <a:p>
-            <a:pPr marL="0" indent="0">
-              <a:lnSpc>
-                <a:spcPct val="90000"/>
-              </a:lnSpc>
-            </a:pPr>
-            <a:r>
-              <a:rPr lang="en-US" dirty="0" smtClean="0"/>
-              <a:t>What aspects of reality does it include and exclude?</a:t>
-            </a:r>
-          </a:p>
-          <a:p>
-            <a:pPr marL="0" indent="0">
-              <a:lnSpc>
-                <a:spcPct val="90000"/>
-              </a:lnSpc>
-            </a:pPr>
             <a:endParaRPr lang="en-US" dirty="0" smtClean="0"/>
           </a:p>
           <a:p>
-            <a:pPr marL="0" indent="0">
-              <a:lnSpc>
-                <a:spcPct val="90000"/>
-              </a:lnSpc>
-            </a:pPr>
-            <a:r>
-              <a:rPr lang="en-US" dirty="0" smtClean="0"/>
-              <a:t>How do the features work together? </a:t>
-            </a:r>
-          </a:p>
-          <a:p>
-            <a:pPr marL="0" indent="0">
-              <a:lnSpc>
-                <a:spcPct val="90000"/>
-              </a:lnSpc>
-            </a:pPr>
+            <a:r>
+              <a:rPr lang="en-US" dirty="0" smtClean="0"/>
+              <a:t>3. Sends data out</a:t>
+            </a:r>
+          </a:p>
+          <a:p>
             <a:endParaRPr lang="en-US" dirty="0" smtClean="0"/>
           </a:p>
           <a:p>
-            <a:pPr marL="0" indent="0">
-              <a:lnSpc>
-                <a:spcPct val="90000"/>
-              </a:lnSpc>
-            </a:pPr>
-            <a:r>
-              <a:rPr lang="en-US" dirty="0" smtClean="0"/>
-              <a:t>Could they work independently from the other features?</a:t>
-            </a:r>
-          </a:p>
-          <a:p>
-            <a:pPr marL="0" indent="0">
-              <a:lnSpc>
-                <a:spcPct val="90000"/>
-              </a:lnSpc>
-            </a:pPr>
             <a:endParaRPr lang="en-US" dirty="0" smtClean="0"/>
           </a:p>
           <a:p>
-            <a:pPr marL="0" indent="0">
-              <a:lnSpc>
-                <a:spcPct val="90000"/>
-              </a:lnSpc>
-            </a:pPr>
-            <a:endParaRPr lang="en-US" dirty="0" smtClean="0"/>
-          </a:p>
-          <a:p>
-            <a:pPr marL="0" indent="0">
-              <a:lnSpc>
-                <a:spcPct val="90000"/>
-              </a:lnSpc>
-            </a:pPr>
-            <a:endParaRPr lang="en-US" dirty="0" smtClean="0"/>
-          </a:p>
-          <a:p>
-            <a:endParaRPr lang="en-US" dirty="0" smtClean="0"/>
-          </a:p>
-          <a:p>
-            <a:endParaRPr lang="en-US" dirty="0" smtClean="0"/>
-          </a:p>
-          <a:p>
-            <a:endParaRPr lang="en-US" dirty="0" smtClean="0"/>
-          </a:p>
-          <a:p>
-            <a:endParaRPr lang="en-US" dirty="0" smtClean="0"/>
+            <a:endParaRPr lang="en-US" dirty="0"/>
           </a:p>
         </p:txBody>
       </p:sp>
@@ -6860,7 +4474,7 @@
           <a:p>
             <a:r>
               <a:rPr lang="en-US" dirty="0" smtClean="0"/>
-              <a:t>Modeling</a:t>
+              <a:t>Types of inputs</a:t>
             </a:r>
             <a:endParaRPr lang="en-US" dirty="0"/>
           </a:p>
@@ -6881,36 +4495,84 @@
           <a:bodyPr/>
           <a:lstStyle/>
           <a:p>
+            <a:endParaRPr lang="en-US" dirty="0" smtClean="0"/>
+          </a:p>
+          <a:p>
+            <a:r>
+              <a:rPr lang="en-US" dirty="0" smtClean="0"/>
+              <a:t>User interaction: mouse, keyboard</a:t>
+            </a:r>
+          </a:p>
+          <a:p>
+            <a:endParaRPr lang="en-US" dirty="0" smtClean="0"/>
+          </a:p>
+          <a:p>
+            <a:r>
+              <a:rPr lang="en-US" dirty="0" smtClean="0"/>
+              <a:t>Multimedia: video camera, microphone, sensors</a:t>
+            </a:r>
+          </a:p>
+          <a:p>
+            <a:endParaRPr lang="en-US" dirty="0" smtClean="0"/>
+          </a:p>
+          <a:p>
+            <a:r>
+              <a:rPr lang="en-US" dirty="0" smtClean="0"/>
+              <a:t>Control messages: instructions from another program</a:t>
+            </a:r>
+          </a:p>
+          <a:p>
+            <a:endParaRPr lang="en-US" dirty="0" smtClean="0"/>
+          </a:p>
+          <a:p>
+            <a:r>
+              <a:rPr lang="en-US" dirty="0" smtClean="0"/>
+              <a:t>Network data: IP packets, UDP </a:t>
+            </a:r>
+            <a:r>
+              <a:rPr lang="en-US" dirty="0" err="1" smtClean="0"/>
+              <a:t>datagrams</a:t>
+            </a:r>
+            <a:endParaRPr lang="en-US" dirty="0" smtClean="0"/>
+          </a:p>
+          <a:p>
+            <a:endParaRPr lang="en-US" dirty="0" smtClean="0"/>
+          </a:p>
+          <a:p>
+            <a:r>
+              <a:rPr lang="en-US" dirty="0" smtClean="0"/>
+              <a:t>Stored data: information stored in databases, files, spreadsheets</a:t>
+            </a:r>
+          </a:p>
+          <a:p>
+            <a:endParaRPr lang="en-US" dirty="0" smtClean="0"/>
+          </a:p>
+          <a:p>
+            <a:r>
+              <a:rPr lang="en-US" dirty="0" smtClean="0"/>
+              <a:t>Real-time data: RSS feeds, market data</a:t>
+            </a:r>
+          </a:p>
+          <a:p>
             <a:endParaRPr lang="en-US" dirty="0"/>
           </a:p>
-        </p:txBody>
-      </p:sp>
-      <p:pic>
-        <p:nvPicPr>
-          <p:cNvPr id="4" name="Picture 4" descr="caliMap"/>
-          <p:cNvPicPr>
-            <a:picLocks noChangeAspect="1" noChangeArrowheads="1"/>
-          </p:cNvPicPr>
-          <p:nvPr/>
-        </p:nvPicPr>
-        <p:blipFill>
-          <a:blip r:embed="rId2"/>
-          <a:srcRect/>
-          <a:stretch>
-            <a:fillRect/>
-          </a:stretch>
-        </p:blipFill>
-        <p:spPr bwMode="auto">
-          <a:xfrm>
-            <a:off x="1235976" y="1293093"/>
-            <a:ext cx="6411695" cy="4777797"/>
-          </a:xfrm>
-          <a:prstGeom prst="rect">
-            <a:avLst/>
-          </a:prstGeom>
-          <a:noFill/>
-        </p:spPr>
-      </p:pic>
+          <a:p>
+            <a:endParaRPr lang="en-US" dirty="0" smtClean="0"/>
+          </a:p>
+          <a:p>
+            <a:r>
+              <a:rPr lang="en-US" dirty="0" smtClean="0"/>
+              <a:t> </a:t>
+            </a:r>
+          </a:p>
+          <a:p>
+            <a:endParaRPr lang="en-US" dirty="0" smtClean="0"/>
+          </a:p>
+          <a:p>
+            <a:endParaRPr lang="en-US" dirty="0"/>
+          </a:p>
+        </p:txBody>
+      </p:sp>
     </p:spTree>
   </p:cSld>
   <p:clrMapOvr>
@@ -6960,7 +4622,7 @@
           <a:p>
             <a:r>
               <a:rPr lang="en-US" dirty="0" smtClean="0"/>
-              <a:t>Classes &amp; Objects</a:t>
+              <a:t>Types of manipulation</a:t>
             </a:r>
             <a:endParaRPr lang="en-US" dirty="0"/>
           </a:p>
@@ -6985,16 +4647,90 @@
           </a:p>
           <a:p>
             <a:r>
-              <a:rPr lang="en-US" dirty="0" smtClean="0"/>
-              <a:t>The main modeling tool in object-orient programming is the </a:t>
-            </a:r>
+              <a:rPr lang="en-US" dirty="0"/>
+              <a:t>F</a:t>
+            </a:r>
+            <a:r>
+              <a:rPr lang="en-US" dirty="0" smtClean="0"/>
+              <a:t>iltering data - removing unimportant stuff</a:t>
+            </a:r>
+          </a:p>
+          <a:p>
+            <a:endParaRPr lang="en-US" dirty="0" smtClean="0"/>
+          </a:p>
+          <a:p>
+            <a:r>
+              <a:rPr lang="en-US" dirty="0"/>
+              <a:t>R</a:t>
+            </a:r>
+            <a:r>
+              <a:rPr lang="en-US" dirty="0" smtClean="0"/>
+              <a:t>earranging data - sorting data into more and less important stuff</a:t>
+            </a:r>
+          </a:p>
+          <a:p>
+            <a:endParaRPr lang="en-US" dirty="0" smtClean="0"/>
+          </a:p>
+          <a:p>
+            <a:r>
+              <a:rPr lang="en-US" dirty="0"/>
+              <a:t>S</a:t>
+            </a:r>
+            <a:r>
+              <a:rPr lang="en-US" dirty="0" smtClean="0"/>
+              <a:t>egmenting data - placing data into various categories</a:t>
+            </a:r>
+          </a:p>
+          <a:p>
+            <a:endParaRPr lang="en-US" dirty="0" smtClean="0"/>
+          </a:p>
+          <a:p>
+            <a:r>
+              <a:rPr lang="en-US" dirty="0"/>
+              <a:t>T</a:t>
+            </a:r>
+            <a:r>
+              <a:rPr lang="en-US" dirty="0" smtClean="0"/>
+              <a:t>ransforming data - applying rules to input data to turn it to new data</a:t>
+            </a:r>
+          </a:p>
+          <a:p>
+            <a:endParaRPr lang="en-US" dirty="0" smtClean="0"/>
+          </a:p>
+          <a:p>
+            <a:endParaRPr lang="en-US" dirty="0" smtClean="0"/>
+          </a:p>
+          <a:p>
+            <a:r>
+              <a:rPr lang="en-US" dirty="0" smtClean="0"/>
+              <a:t>In very general computer science terms:</a:t>
+            </a:r>
+          </a:p>
+          <a:p>
+            <a:endParaRPr lang="en-US" dirty="0" smtClean="0"/>
+          </a:p>
+          <a:p>
+            <a:r>
+              <a:rPr lang="en-US" dirty="0" smtClean="0"/>
+              <a:t>first, you place the input data into appropriate data structures...</a:t>
+            </a:r>
+          </a:p>
+          <a:p>
+            <a:r>
+              <a:rPr lang="en-US" dirty="0" smtClean="0"/>
+              <a:t>...and then manipulate the data using appropriate algorithms</a:t>
+            </a:r>
+          </a:p>
+          <a:p>
+            <a:endParaRPr lang="en-US" dirty="0" smtClean="0"/>
+          </a:p>
+          <a:p>
+            <a:endParaRPr lang="en-US" dirty="0" smtClean="0"/>
+          </a:p>
+          <a:p>
             <a:r>
               <a:rPr lang="en-US" i="1" dirty="0" smtClean="0"/>
-              <a:t>class </a:t>
-            </a:r>
-            <a:r>
-              <a:rPr lang="en-US" dirty="0" smtClean="0"/>
-              <a:t>definition.</a:t>
+              <a:t>data structure : noun :: algorithm : verb</a:t>
             </a:r>
           </a:p>
           <a:p>
@@ -7003,109 +4739,40 @@
           <a:p>
             <a:r>
               <a:rPr lang="en-US" dirty="0" smtClean="0"/>
-              <a:t>A </a:t>
-            </a:r>
-            <a:r>
-              <a:rPr lang="en-US" b="1" dirty="0" smtClean="0"/>
-              <a:t>class</a:t>
-            </a:r>
-            <a:r>
-              <a:rPr lang="en-US" dirty="0" smtClean="0"/>
-              <a:t> is a </a:t>
-            </a:r>
-            <a:r>
-              <a:rPr lang="en-US" i="1" dirty="0" smtClean="0"/>
-              <a:t>description</a:t>
-            </a:r>
-            <a:r>
-              <a:rPr lang="en-US" dirty="0" smtClean="0"/>
-              <a:t> of a discrete entity within your model.</a:t>
+              <a:t>"my program uses the </a:t>
+            </a:r>
+            <a:r>
+              <a:rPr lang="en-US" dirty="0" err="1" smtClean="0"/>
+              <a:t>quicksort</a:t>
+            </a:r>
+            <a:r>
+              <a:rPr lang="en-US" dirty="0" smtClean="0"/>
+              <a:t> algorithm to rearrange the linked list"</a:t>
+            </a:r>
+          </a:p>
+          <a:p>
+            <a:r>
+              <a:rPr lang="en-US" dirty="0" smtClean="0"/>
+              <a:t>"my program uses a low pass filter to attenuate high-frequencies in my ring buffer"</a:t>
             </a:r>
           </a:p>
           <a:p>
             <a:endParaRPr lang="en-US" dirty="0" smtClean="0"/>
           </a:p>
           <a:p>
-            <a:r>
-              <a:rPr lang="en-US" dirty="0" smtClean="0"/>
-              <a:t>It describes the attributes that make up a particular thing, and it describes the ways you can interact with that thing.</a:t>
-            </a:r>
-          </a:p>
-          <a:p>
             <a:endParaRPr lang="en-US" dirty="0" smtClean="0"/>
           </a:p>
           <a:p>
-            <a:r>
-              <a:rPr lang="en-US" dirty="0" smtClean="0"/>
-              <a:t>And an </a:t>
-            </a:r>
-            <a:r>
-              <a:rPr lang="en-US" b="1" dirty="0" smtClean="0"/>
-              <a:t>object</a:t>
-            </a:r>
-            <a:r>
-              <a:rPr lang="en-US" dirty="0" smtClean="0"/>
-              <a:t> is an actual </a:t>
-            </a:r>
-            <a:r>
-              <a:rPr lang="en-US" i="1" dirty="0" smtClean="0"/>
-              <a:t>instance </a:t>
-            </a:r>
-            <a:r>
-              <a:rPr lang="en-US" dirty="0" smtClean="0"/>
-              <a:t>of that entity within your model.</a:t>
-            </a:r>
+            <a:endParaRPr lang="en-US" dirty="0"/>
           </a:p>
           <a:p>
             <a:endParaRPr lang="en-US" dirty="0" smtClean="0"/>
           </a:p>
           <a:p>
-            <a:r>
-              <a:rPr lang="en-US" dirty="0" smtClean="0"/>
-              <a:t>For example, your model of a highway system might have a single general Car class. But when you are investigating traffic patterns you might need to create thousands of instances of that Car class.</a:t>
-            </a:r>
+            <a:endParaRPr lang="en-US" dirty="0"/>
           </a:p>
           <a:p>
             <a:endParaRPr lang="en-US" dirty="0" smtClean="0"/>
-          </a:p>
-          <a:p>
-            <a:r>
-              <a:rPr lang="en-US" dirty="0" smtClean="0"/>
-              <a:t>You can think of an an object as a Noun (an </a:t>
-            </a:r>
-            <a:r>
-              <a:rPr lang="en-US" i="1" dirty="0" smtClean="0"/>
-              <a:t>instance</a:t>
-            </a:r>
-            <a:r>
-              <a:rPr lang="en-US" dirty="0" smtClean="0"/>
-              <a:t> of the class), which has various Adjectives (</a:t>
-            </a:r>
-            <a:r>
-              <a:rPr lang="en-US" i="1" dirty="0" smtClean="0"/>
-              <a:t>fields</a:t>
-            </a:r>
-            <a:r>
-              <a:rPr lang="en-US" dirty="0" smtClean="0"/>
-              <a:t>) that are used to describe it, and which can be manipulated by various Verbs (</a:t>
-            </a:r>
-            <a:r>
-              <a:rPr lang="en-US" i="1" dirty="0" smtClean="0"/>
-              <a:t>methods</a:t>
-            </a:r>
-            <a:r>
-              <a:rPr lang="en-US" dirty="0" smtClean="0"/>
-              <a:t>).</a:t>
-            </a:r>
-          </a:p>
-          <a:p>
-            <a:endParaRPr lang="en-US" dirty="0" smtClean="0"/>
-          </a:p>
-          <a:p>
-            <a:r>
-              <a:rPr lang="en-US" dirty="0" smtClean="0"/>
-              <a:t>  </a:t>
-            </a:r>
           </a:p>
           <a:p>
             <a:endParaRPr lang="en-US" dirty="0" smtClean="0"/>
@@ -7129,749 +4796,13 @@
   <p:clrMapOvr>
     <a:masterClrMapping/>
   </p:clrMapOvr>
-</p:sld>
-</file>
-
-<file path=ppt/slides/slide7.xml><?xml version="1.0" encoding="utf-8"?>
-<p:sld xmlns:a="http://schemas.openxmlformats.org/drawingml/2006/main" xmlns:r="http://schemas.openxmlformats.org/officeDocument/2006/relationships" xmlns:mc="http://schemas.openxmlformats.org/markup-compatibility/2006" xmlns:mv="urn:schemas-microsoft-com:mac:vml" xmlns:p="http://schemas.openxmlformats.org/presentationml/2006/main" mc:Ignorable="mv" mc:PreserveAttributes="mv:*">
-  <p:cSld>
-    <p:spTree>
-      <p:nvGrpSpPr>
-        <p:cNvPr id="1" name=""/>
-        <p:cNvGrpSpPr/>
-        <p:nvPr/>
-      </p:nvGrpSpPr>
-      <p:grpSpPr>
-        <a:xfrm>
-          <a:off x="0" y="0"/>
-          <a:ext cx="0" cy="0"/>
-          <a:chOff x="0" y="0"/>
-          <a:chExt cx="0" cy="0"/>
-        </a:xfrm>
-      </p:grpSpPr>
-      <p:sp>
-        <p:nvSpPr>
-          <p:cNvPr id="2" name="Title 1"/>
-          <p:cNvSpPr>
-            <a:spLocks noGrp="1"/>
-          </p:cNvSpPr>
-          <p:nvPr>
-            <p:ph type="title"/>
-          </p:nvPr>
-        </p:nvSpPr>
-        <p:spPr/>
-        <p:txBody>
-          <a:bodyPr/>
-          <a:lstStyle/>
-          <a:p>
-            <a:r>
-              <a:rPr lang="en-US" dirty="0" smtClean="0"/>
-              <a:t>Classes &amp; Objects</a:t>
-            </a:r>
-            <a:endParaRPr lang="en-US" dirty="0"/>
-          </a:p>
-        </p:txBody>
-      </p:sp>
-      <p:sp>
-        <p:nvSpPr>
-          <p:cNvPr id="3" name="Content Placeholder 2"/>
-          <p:cNvSpPr>
-            <a:spLocks noGrp="1"/>
-          </p:cNvSpPr>
-          <p:nvPr>
-            <p:ph idx="1"/>
-          </p:nvPr>
-        </p:nvSpPr>
-        <p:spPr/>
-        <p:txBody>
-          <a:bodyPr/>
-          <a:lstStyle/>
-          <a:p>
-            <a:r>
-              <a:rPr lang="en-US" dirty="0" smtClean="0"/>
-              <a:t>//</a:t>
-            </a:r>
-            <a:r>
-              <a:rPr lang="en-US" i="1" dirty="0" smtClean="0"/>
-              <a:t>class definition</a:t>
-            </a:r>
-          </a:p>
-          <a:p>
-            <a:r>
-              <a:rPr lang="en-US" dirty="0" smtClean="0"/>
-              <a:t>public class Car {</a:t>
-            </a:r>
-          </a:p>
-          <a:p>
-            <a:r>
-              <a:rPr lang="en-US" dirty="0" smtClean="0"/>
-              <a:t>  //</a:t>
-            </a:r>
-            <a:r>
-              <a:rPr lang="en-US" i="1" dirty="0" smtClean="0"/>
-              <a:t>important properties</a:t>
-            </a:r>
-          </a:p>
-          <a:p>
-            <a:r>
-              <a:rPr lang="en-US" dirty="0" smtClean="0"/>
-              <a:t>  private String brand;</a:t>
-            </a:r>
-          </a:p>
-          <a:p>
-            <a:r>
-              <a:rPr lang="en-US" dirty="0" smtClean="0"/>
-              <a:t>  private </a:t>
-            </a:r>
-            <a:r>
-              <a:rPr lang="en-US" dirty="0" err="1" smtClean="0"/>
-              <a:t>boolean</a:t>
-            </a:r>
-            <a:r>
-              <a:rPr lang="en-US" dirty="0" smtClean="0"/>
-              <a:t> </a:t>
-            </a:r>
-            <a:r>
-              <a:rPr lang="en-US" dirty="0" err="1" smtClean="0"/>
-              <a:t>isAutomatic</a:t>
-            </a:r>
-            <a:r>
-              <a:rPr lang="en-US" dirty="0" smtClean="0"/>
-              <a:t>;</a:t>
-            </a:r>
-          </a:p>
-          <a:p>
-            <a:r>
-              <a:rPr lang="en-US" dirty="0" smtClean="0"/>
-              <a:t>  private </a:t>
-            </a:r>
-            <a:r>
-              <a:rPr lang="en-US" dirty="0" err="1" smtClean="0"/>
-              <a:t>int</a:t>
-            </a:r>
-            <a:r>
-              <a:rPr lang="en-US" dirty="0" smtClean="0"/>
-              <a:t> year;</a:t>
-            </a:r>
-          </a:p>
-          <a:p>
-            <a:r>
-              <a:rPr lang="en-US" dirty="0" smtClean="0"/>
-              <a:t>  private double </a:t>
-            </a:r>
-            <a:r>
-              <a:rPr lang="en-US" dirty="0" err="1" smtClean="0"/>
-              <a:t>maxSpeed</a:t>
-            </a:r>
-            <a:r>
-              <a:rPr lang="en-US" dirty="0" smtClean="0"/>
-              <a:t>;</a:t>
-            </a:r>
-          </a:p>
-          <a:p>
-            <a:endParaRPr lang="en-US" dirty="0" smtClean="0"/>
-          </a:p>
-          <a:p>
-            <a:r>
-              <a:rPr lang="en-US" dirty="0" smtClean="0"/>
-              <a:t>  //</a:t>
-            </a:r>
-            <a:r>
-              <a:rPr lang="en-US" i="1" dirty="0" smtClean="0"/>
-              <a:t>constructor -- turns the class definition into an object you can manipulate</a:t>
-            </a:r>
-          </a:p>
-          <a:p>
-            <a:r>
-              <a:rPr lang="en-US" dirty="0" smtClean="0"/>
-              <a:t>  public </a:t>
-            </a:r>
-            <a:r>
-              <a:rPr lang="en-US" dirty="0" err="1" smtClean="0"/>
-              <a:t>Car(String</a:t>
-            </a:r>
-            <a:r>
-              <a:rPr lang="en-US" dirty="0" smtClean="0"/>
-              <a:t> brand, </a:t>
-            </a:r>
-            <a:r>
-              <a:rPr lang="en-US" dirty="0" err="1" smtClean="0"/>
-              <a:t>boolean</a:t>
-            </a:r>
-            <a:r>
-              <a:rPr lang="en-US" dirty="0" smtClean="0"/>
-              <a:t> </a:t>
-            </a:r>
-            <a:r>
-              <a:rPr lang="en-US" dirty="0" err="1" smtClean="0"/>
-              <a:t>isAutomatic</a:t>
-            </a:r>
-            <a:r>
-              <a:rPr lang="en-US" dirty="0" smtClean="0"/>
-              <a:t>, </a:t>
-            </a:r>
-            <a:r>
-              <a:rPr lang="en-US" dirty="0" err="1" smtClean="0"/>
-              <a:t>int</a:t>
-            </a:r>
-            <a:r>
-              <a:rPr lang="en-US" dirty="0" smtClean="0"/>
-              <a:t> year, double </a:t>
-            </a:r>
-            <a:r>
-              <a:rPr lang="en-US" dirty="0" err="1" smtClean="0"/>
-              <a:t>maxSpeed</a:t>
-            </a:r>
-            <a:r>
-              <a:rPr lang="en-US" dirty="0" smtClean="0"/>
-              <a:t>)</a:t>
-            </a:r>
-          </a:p>
-          <a:p>
-            <a:r>
-              <a:rPr lang="en-US" dirty="0" smtClean="0"/>
-              <a:t>  {</a:t>
-            </a:r>
-          </a:p>
-          <a:p>
-            <a:r>
-              <a:rPr lang="en-US" dirty="0" smtClean="0"/>
-              <a:t>	//</a:t>
-            </a:r>
-            <a:r>
-              <a:rPr lang="en-US" i="1" dirty="0" smtClean="0"/>
-              <a:t>set the "state" of the object</a:t>
-            </a:r>
-          </a:p>
-          <a:p>
-            <a:r>
-              <a:rPr lang="en-US" dirty="0" smtClean="0"/>
-              <a:t>	</a:t>
-            </a:r>
-            <a:r>
-              <a:rPr lang="en-US" dirty="0" err="1" smtClean="0"/>
-              <a:t>this.brand</a:t>
-            </a:r>
-            <a:r>
-              <a:rPr lang="en-US" dirty="0" smtClean="0"/>
-              <a:t> = brand;</a:t>
-            </a:r>
-          </a:p>
-          <a:p>
-            <a:r>
-              <a:rPr lang="en-US" dirty="0" smtClean="0"/>
-              <a:t>	</a:t>
-            </a:r>
-            <a:r>
-              <a:rPr lang="en-US" dirty="0" err="1" smtClean="0"/>
-              <a:t>this.isAutomatic</a:t>
-            </a:r>
-            <a:r>
-              <a:rPr lang="en-US" dirty="0" smtClean="0"/>
-              <a:t> = </a:t>
-            </a:r>
-            <a:r>
-              <a:rPr lang="en-US" dirty="0" err="1" smtClean="0"/>
-              <a:t>isAutomatic</a:t>
-            </a:r>
-            <a:r>
-              <a:rPr lang="en-US" dirty="0" smtClean="0"/>
-              <a:t>;</a:t>
-            </a:r>
-          </a:p>
-          <a:p>
-            <a:r>
-              <a:rPr lang="en-US" dirty="0" smtClean="0"/>
-              <a:t>   	</a:t>
-            </a:r>
-            <a:r>
-              <a:rPr lang="en-US" dirty="0" err="1" smtClean="0"/>
-              <a:t>this.year</a:t>
-            </a:r>
-            <a:r>
-              <a:rPr lang="en-US" dirty="0" smtClean="0"/>
-              <a:t> = year;</a:t>
-            </a:r>
-          </a:p>
-          <a:p>
-            <a:r>
-              <a:rPr lang="en-US" dirty="0" smtClean="0"/>
-              <a:t>   	</a:t>
-            </a:r>
-            <a:r>
-              <a:rPr lang="en-US" dirty="0" err="1" smtClean="0"/>
-              <a:t>this.maxSpeed</a:t>
-            </a:r>
-            <a:r>
-              <a:rPr lang="en-US" dirty="0" smtClean="0"/>
-              <a:t> = </a:t>
-            </a:r>
-            <a:r>
-              <a:rPr lang="en-US" dirty="0" err="1" smtClean="0"/>
-              <a:t>maxSpeed</a:t>
-            </a:r>
-            <a:r>
-              <a:rPr lang="en-US" dirty="0" smtClean="0"/>
-              <a:t>;</a:t>
-            </a:r>
-          </a:p>
-          <a:p>
-            <a:r>
-              <a:rPr lang="en-US" dirty="0" smtClean="0"/>
-              <a:t>  }</a:t>
-            </a:r>
-          </a:p>
-          <a:p>
-            <a:r>
-              <a:rPr lang="en-US" dirty="0" smtClean="0"/>
-              <a:t>  //</a:t>
-            </a:r>
-            <a:r>
-              <a:rPr lang="en-US" i="1" dirty="0" err="1" smtClean="0"/>
-              <a:t>accessor</a:t>
-            </a:r>
-            <a:r>
-              <a:rPr lang="en-US" i="1" dirty="0" smtClean="0"/>
-              <a:t> methods...</a:t>
-            </a:r>
-          </a:p>
-          <a:p>
-            <a:r>
-              <a:rPr lang="en-US" dirty="0" smtClean="0"/>
-              <a:t>  public String </a:t>
-            </a:r>
-            <a:r>
-              <a:rPr lang="en-US" dirty="0" err="1" smtClean="0"/>
-              <a:t>getBrand</a:t>
-            </a:r>
-            <a:r>
-              <a:rPr lang="en-US" dirty="0" smtClean="0"/>
-              <a:t>()</a:t>
-            </a:r>
-          </a:p>
-          <a:p>
-            <a:r>
-              <a:rPr lang="en-US" dirty="0" smtClean="0"/>
-              <a:t>  {</a:t>
-            </a:r>
-          </a:p>
-          <a:p>
-            <a:r>
-              <a:rPr lang="en-US" dirty="0" smtClean="0"/>
-              <a:t>		return brand;</a:t>
-            </a:r>
-          </a:p>
-          <a:p>
-            <a:r>
-              <a:rPr lang="en-US" dirty="0" smtClean="0"/>
-              <a:t>  }</a:t>
-            </a:r>
-          </a:p>
-          <a:p>
-            <a:r>
-              <a:rPr lang="en-US" dirty="0" smtClean="0"/>
-              <a:t>}</a:t>
-            </a:r>
-          </a:p>
-          <a:p>
-            <a:endParaRPr lang="en-US" dirty="0" smtClean="0"/>
-          </a:p>
-          <a:p>
-            <a:endParaRPr lang="en-US" dirty="0" smtClean="0"/>
-          </a:p>
-          <a:p>
-            <a:endParaRPr lang="en-US" dirty="0" smtClean="0"/>
-          </a:p>
-          <a:p>
-            <a:endParaRPr lang="en-US" dirty="0" smtClean="0"/>
-          </a:p>
-          <a:p>
-            <a:endParaRPr lang="en-US" dirty="0" smtClean="0"/>
-          </a:p>
-          <a:p>
-            <a:endParaRPr lang="en-US" dirty="0" smtClean="0"/>
-          </a:p>
-          <a:p>
-            <a:endParaRPr lang="en-US" dirty="0" smtClean="0"/>
-          </a:p>
-          <a:p>
-            <a:endParaRPr lang="en-US" dirty="0" smtClean="0"/>
-          </a:p>
-          <a:p>
-            <a:endParaRPr lang="en-US" dirty="0"/>
-          </a:p>
-        </p:txBody>
-      </p:sp>
-    </p:spTree>
-  </p:cSld>
-  <p:clrMapOvr>
-    <a:masterClrMapping/>
-  </p:clrMapOvr>
-</p:sld>
-</file>
-
-<file path=ppt/slides/slide8.xml><?xml version="1.0" encoding="utf-8"?>
-<p:sld xmlns:a="http://schemas.openxmlformats.org/drawingml/2006/main" xmlns:r="http://schemas.openxmlformats.org/officeDocument/2006/relationships" xmlns:mc="http://schemas.openxmlformats.org/markup-compatibility/2006" xmlns:mv="urn:schemas-microsoft-com:mac:vml" xmlns:p="http://schemas.openxmlformats.org/presentationml/2006/main" mc:Ignorable="mv" mc:PreserveAttributes="mv:*">
-  <p:cSld>
-    <p:spTree>
-      <p:nvGrpSpPr>
-        <p:cNvPr id="1" name=""/>
-        <p:cNvGrpSpPr/>
-        <p:nvPr/>
-      </p:nvGrpSpPr>
-      <p:grpSpPr>
-        <a:xfrm>
-          <a:off x="0" y="0"/>
-          <a:ext cx="0" cy="0"/>
-          <a:chOff x="0" y="0"/>
-          <a:chExt cx="0" cy="0"/>
-        </a:xfrm>
-      </p:grpSpPr>
-      <p:sp>
-        <p:nvSpPr>
-          <p:cNvPr id="2" name="Title 1"/>
-          <p:cNvSpPr>
-            <a:spLocks noGrp="1"/>
-          </p:cNvSpPr>
-          <p:nvPr>
-            <p:ph type="title"/>
-          </p:nvPr>
-        </p:nvSpPr>
-        <p:spPr/>
-        <p:txBody>
-          <a:bodyPr/>
-          <a:lstStyle/>
-          <a:p>
-            <a:r>
-              <a:rPr lang="en-US" dirty="0" smtClean="0"/>
-              <a:t>Object-oriented</a:t>
-            </a:r>
-            <a:endParaRPr lang="en-US" dirty="0"/>
-          </a:p>
-        </p:txBody>
-      </p:sp>
-      <p:sp>
-        <p:nvSpPr>
-          <p:cNvPr id="3" name="Content Placeholder 2"/>
-          <p:cNvSpPr>
-            <a:spLocks noGrp="1"/>
-          </p:cNvSpPr>
-          <p:nvPr>
-            <p:ph idx="1"/>
-          </p:nvPr>
-        </p:nvSpPr>
-        <p:spPr/>
-        <p:txBody>
-          <a:bodyPr/>
-          <a:lstStyle/>
-          <a:p>
-            <a:endParaRPr lang="en-US" dirty="0" smtClean="0"/>
-          </a:p>
-          <a:p>
-            <a:endParaRPr lang="en-US" dirty="0" smtClean="0"/>
-          </a:p>
-          <a:p>
-            <a:endParaRPr lang="en-US" dirty="0" smtClean="0"/>
-          </a:p>
-          <a:p>
-            <a:r>
-              <a:rPr lang="en-US" dirty="0" smtClean="0"/>
-              <a:t>The particular ways in which object-oriented code models your problem domain includes these 3 interrelated concepts:</a:t>
-            </a:r>
-          </a:p>
-          <a:p>
-            <a:endParaRPr lang="en-US" dirty="0" smtClean="0"/>
-          </a:p>
-          <a:p>
-            <a:endParaRPr lang="en-US" dirty="0" smtClean="0"/>
-          </a:p>
-          <a:p>
-            <a:r>
-              <a:rPr lang="en-US" dirty="0" smtClean="0"/>
-              <a:t>Encapsulation</a:t>
-            </a:r>
-          </a:p>
-          <a:p>
-            <a:endParaRPr lang="en-US" dirty="0" smtClean="0"/>
-          </a:p>
-          <a:p>
-            <a:endParaRPr lang="en-US" dirty="0" smtClean="0"/>
-          </a:p>
-          <a:p>
-            <a:endParaRPr lang="en-US" dirty="0" smtClean="0"/>
-          </a:p>
-          <a:p>
-            <a:r>
-              <a:rPr lang="en-US" dirty="0" smtClean="0"/>
-              <a:t>Inheritance</a:t>
-            </a:r>
-          </a:p>
-          <a:p>
-            <a:endParaRPr lang="en-US" dirty="0" smtClean="0"/>
-          </a:p>
-          <a:p>
-            <a:endParaRPr lang="en-US" dirty="0" smtClean="0"/>
-          </a:p>
-          <a:p>
-            <a:endParaRPr lang="en-US" dirty="0" smtClean="0"/>
-          </a:p>
-          <a:p>
-            <a:r>
-              <a:rPr lang="en-US" dirty="0" smtClean="0"/>
-              <a:t>Polymorphism</a:t>
-            </a:r>
-            <a:endParaRPr lang="en-US" dirty="0"/>
-          </a:p>
-        </p:txBody>
-      </p:sp>
-    </p:spTree>
-  </p:cSld>
-  <p:clrMapOvr>
-    <a:masterClrMapping/>
-  </p:clrMapOvr>
-</p:sld>
-</file>
-
-<file path=ppt/slides/slide9.xml><?xml version="1.0" encoding="utf-8"?>
-<p:sld xmlns:a="http://schemas.openxmlformats.org/drawingml/2006/main" xmlns:r="http://schemas.openxmlformats.org/officeDocument/2006/relationships" xmlns:mc="http://schemas.openxmlformats.org/markup-compatibility/2006" xmlns:mv="urn:schemas-microsoft-com:mac:vml" xmlns:p="http://schemas.openxmlformats.org/presentationml/2006/main" mc:Ignorable="mv" mc:PreserveAttributes="mv:*">
-  <p:cSld>
-    <p:spTree>
-      <p:nvGrpSpPr>
-        <p:cNvPr id="1" name=""/>
-        <p:cNvGrpSpPr/>
-        <p:nvPr/>
-      </p:nvGrpSpPr>
-      <p:grpSpPr>
-        <a:xfrm>
-          <a:off x="0" y="0"/>
-          <a:ext cx="0" cy="0"/>
-          <a:chOff x="0" y="0"/>
-          <a:chExt cx="0" cy="0"/>
-        </a:xfrm>
-      </p:grpSpPr>
-      <p:sp>
-        <p:nvSpPr>
-          <p:cNvPr id="2" name="Title 1"/>
-          <p:cNvSpPr>
-            <a:spLocks noGrp="1"/>
-          </p:cNvSpPr>
-          <p:nvPr>
-            <p:ph type="title"/>
-          </p:nvPr>
-        </p:nvSpPr>
-        <p:spPr/>
-        <p:txBody>
-          <a:bodyPr/>
-          <a:lstStyle/>
-          <a:p>
-            <a:r>
-              <a:rPr lang="en-US" dirty="0" smtClean="0"/>
-              <a:t>Encapsulation</a:t>
-            </a:r>
-            <a:endParaRPr lang="en-US" dirty="0"/>
-          </a:p>
-        </p:txBody>
-      </p:sp>
-      <p:sp>
-        <p:nvSpPr>
-          <p:cNvPr id="3" name="Content Placeholder 2"/>
-          <p:cNvSpPr>
-            <a:spLocks noGrp="1"/>
-          </p:cNvSpPr>
-          <p:nvPr>
-            <p:ph idx="1"/>
-          </p:nvPr>
-        </p:nvSpPr>
-        <p:spPr/>
-        <p:txBody>
-          <a:bodyPr/>
-          <a:lstStyle/>
-          <a:p>
-            <a:pPr marL="381000" indent="-381000">
-              <a:lnSpc>
-                <a:spcPct val="90000"/>
-              </a:lnSpc>
-            </a:pPr>
-            <a:endParaRPr lang="en-US" dirty="0" smtClean="0"/>
-          </a:p>
-          <a:p>
-            <a:pPr marL="381000" indent="-381000">
-              <a:lnSpc>
-                <a:spcPct val="90000"/>
-              </a:lnSpc>
-            </a:pPr>
-            <a:r>
-              <a:rPr lang="en-US" dirty="0" smtClean="0"/>
-              <a:t>Encapsulation means that each object is a kind of “capsule” of data.</a:t>
-            </a:r>
-          </a:p>
-          <a:p>
-            <a:pPr marL="381000" indent="-381000">
-              <a:lnSpc>
-                <a:spcPct val="90000"/>
-              </a:lnSpc>
-            </a:pPr>
-            <a:endParaRPr lang="en-US" dirty="0" smtClean="0"/>
-          </a:p>
-          <a:p>
-            <a:pPr marL="381000" indent="-381000">
-              <a:lnSpc>
-                <a:spcPct val="90000"/>
-              </a:lnSpc>
-            </a:pPr>
-            <a:r>
-              <a:rPr lang="en-US" dirty="0" smtClean="0"/>
-              <a:t>You instantiate an object of a specific class.</a:t>
-            </a:r>
-          </a:p>
-          <a:p>
-            <a:pPr marL="381000" indent="-381000">
-              <a:lnSpc>
-                <a:spcPct val="90000"/>
-              </a:lnSpc>
-            </a:pPr>
-            <a:endParaRPr lang="en-US" dirty="0" smtClean="0"/>
-          </a:p>
-          <a:p>
-            <a:pPr marL="381000" indent="-381000">
-              <a:lnSpc>
-                <a:spcPct val="90000"/>
-              </a:lnSpc>
-            </a:pPr>
-            <a:r>
-              <a:rPr lang="en-US" dirty="0" smtClean="0"/>
-              <a:t>Your object has data (instance variables).</a:t>
-            </a:r>
-          </a:p>
-          <a:p>
-            <a:pPr marL="381000" indent="-381000">
-              <a:lnSpc>
-                <a:spcPct val="90000"/>
-              </a:lnSpc>
-            </a:pPr>
-            <a:endParaRPr lang="en-US" dirty="0" smtClean="0"/>
-          </a:p>
-          <a:p>
-            <a:pPr marL="381000" indent="-381000">
-              <a:lnSpc>
-                <a:spcPct val="90000"/>
-              </a:lnSpc>
-            </a:pPr>
-            <a:r>
-              <a:rPr lang="en-US" dirty="0" smtClean="0"/>
-              <a:t>You access the data through the specific methods defined in the object.</a:t>
-            </a:r>
-          </a:p>
-          <a:p>
-            <a:pPr marL="381000" indent="-381000">
-              <a:lnSpc>
-                <a:spcPct val="90000"/>
-              </a:lnSpc>
-            </a:pPr>
-            <a:endParaRPr lang="en-US" dirty="0" smtClean="0"/>
-          </a:p>
-          <a:p>
-            <a:pPr marL="381000" indent="-381000">
-              <a:lnSpc>
-                <a:spcPct val="90000"/>
-              </a:lnSpc>
-            </a:pPr>
-            <a:r>
-              <a:rPr lang="en-US" dirty="0" smtClean="0"/>
-              <a:t>There is no other way to access the data, except through these methods.</a:t>
-            </a:r>
-          </a:p>
-          <a:p>
-            <a:pPr marL="381000" indent="-381000">
-              <a:lnSpc>
-                <a:spcPct val="90000"/>
-              </a:lnSpc>
-            </a:pPr>
-            <a:endParaRPr lang="en-US" dirty="0" smtClean="0"/>
-          </a:p>
-          <a:p>
-            <a:pPr marL="381000" indent="-381000">
-              <a:lnSpc>
-                <a:spcPct val="90000"/>
-              </a:lnSpc>
-            </a:pPr>
-            <a:r>
-              <a:rPr lang="en-US" dirty="0" smtClean="0"/>
-              <a:t>The data is “hidden”, private to the object, and it is clearly defined how we can access and change the data.</a:t>
-            </a:r>
-          </a:p>
-          <a:p>
-            <a:pPr marL="381000" indent="-381000">
-              <a:lnSpc>
-                <a:spcPct val="90000"/>
-              </a:lnSpc>
-            </a:pPr>
-            <a:endParaRPr lang="en-US" dirty="0" smtClean="0"/>
-          </a:p>
-          <a:p>
-            <a:pPr marL="381000" indent="-381000">
-              <a:lnSpc>
-                <a:spcPct val="90000"/>
-              </a:lnSpc>
-            </a:pPr>
-            <a:r>
-              <a:rPr lang="en-US" dirty="0" smtClean="0"/>
-              <a:t>For example, if you were modeling a bank account, your Account class might have a </a:t>
-            </a:r>
-            <a:r>
-              <a:rPr lang="en-US" dirty="0" err="1" smtClean="0"/>
-              <a:t>getBalance</a:t>
-            </a:r>
-            <a:r>
-              <a:rPr lang="en-US" dirty="0" smtClean="0"/>
-              <a:t> and a </a:t>
-            </a:r>
-            <a:r>
-              <a:rPr lang="en-US" dirty="0" err="1" smtClean="0"/>
-              <a:t>setBalance</a:t>
-            </a:r>
-            <a:r>
-              <a:rPr lang="en-US" dirty="0" smtClean="0"/>
-              <a:t> method to access and change the data. You could add a check inside the </a:t>
-            </a:r>
-            <a:r>
-              <a:rPr lang="en-US" dirty="0" err="1" smtClean="0"/>
-              <a:t>setBalance</a:t>
-            </a:r>
-            <a:r>
-              <a:rPr lang="en-US" dirty="0" smtClean="0"/>
-              <a:t> method so that it wouldn’t let you set the balance to a negative number.</a:t>
-            </a:r>
-          </a:p>
-          <a:p>
-            <a:pPr marL="381000" indent="-381000">
-              <a:lnSpc>
-                <a:spcPct val="90000"/>
-              </a:lnSpc>
-            </a:pPr>
-            <a:endParaRPr lang="en-US" dirty="0" smtClean="0"/>
-          </a:p>
-          <a:p>
-            <a:pPr marL="381000" indent="-381000">
-              <a:lnSpc>
-                <a:spcPct val="90000"/>
-              </a:lnSpc>
-            </a:pPr>
-            <a:r>
-              <a:rPr lang="en-US" dirty="0" smtClean="0"/>
-              <a:t>By constraining the way in which you can get to data, you simplify your programming model and hopefully reduce unwanted side-effects and bugs that crash your program. </a:t>
-            </a:r>
-          </a:p>
-          <a:p>
-            <a:endParaRPr lang="en-US" dirty="0"/>
-          </a:p>
-        </p:txBody>
-      </p:sp>
-    </p:spTree>
-  </p:cSld>
-  <p:clrMapOvr>
-    <a:masterClrMapping/>
-  </p:clrMapOvr>
+  <p:timing>
+    <p:tnLst>
+      <p:par>
+        <p:cTn id="1" dur="indefinite" restart="never" nodeType="tmRoot"/>
+      </p:par>
+    </p:tnLst>
+  </p:timing>
 </p:sld>
 </file>
 

</xml_diff>

<commit_message>
Added stuff for week 9
</commit_message>
<xml_diff>
--- a/slides/template.pptx
+++ b/slides/template.pptx
@@ -5,18 +5,17 @@
     <p:sldMasterId id="2147483648" r:id="rId1"/>
   </p:sldMasterIdLst>
   <p:notesMasterIdLst>
-    <p:notesMasterId r:id="rId8"/>
+    <p:notesMasterId r:id="rId7"/>
   </p:notesMasterIdLst>
   <p:handoutMasterIdLst>
-    <p:handoutMasterId r:id="rId9"/>
+    <p:handoutMasterId r:id="rId8"/>
   </p:handoutMasterIdLst>
   <p:sldIdLst>
     <p:sldId id="262" r:id="rId2"/>
-    <p:sldId id="269" r:id="rId3"/>
-    <p:sldId id="270" r:id="rId4"/>
+    <p:sldId id="263" r:id="rId3"/>
+    <p:sldId id="264" r:id="rId4"/>
     <p:sldId id="265" r:id="rId5"/>
     <p:sldId id="266" r:id="rId6"/>
-    <p:sldId id="267" r:id="rId7"/>
   </p:sldIdLst>
   <p:sldSz cx="9144000" cy="6858000" type="screen4x3"/>
   <p:notesSz cx="6858000" cy="9144000"/>
@@ -201,7 +200,7 @@
             <a:fld id="{43DBBD18-6C88-F045-A73C-EAB7098132B3}" type="datetime1">
               <a:rPr lang="en-US" smtClean="0"/>
               <a:pPr/>
-              <a:t>11/2/10</a:t>
+              <a:t>11/23/10</a:t>
             </a:fld>
             <a:endParaRPr lang="en-US"/>
           </a:p>
@@ -364,7 +363,7 @@
             <a:fld id="{EAEF232E-3F8A-2D4B-A08F-882F821D32B7}" type="datetime1">
               <a:rPr lang="en-US" smtClean="0"/>
               <a:pPr/>
-              <a:t>11/2/10</a:t>
+              <a:t>11/23/10</a:t>
             </a:fld>
             <a:endParaRPr lang="en-US"/>
           </a:p>
@@ -3871,7 +3870,7 @@
             </a:r>
             <a:r>
               <a:rPr lang="en-US" dirty="0" smtClean="0"/>
-              <a:t> Collaborative Presentation</a:t>
+              <a:t> Presentations</a:t>
             </a:r>
           </a:p>
           <a:p>
@@ -3884,15 +3883,16 @@
             </a:r>
             <a:r>
               <a:rPr lang="en-US" dirty="0" smtClean="0"/>
-              <a:t> </a:t>
-            </a:r>
-            <a:r>
-              <a:rPr lang="en-US" dirty="0" err="1" smtClean="0"/>
-              <a:t>VisWeek</a:t>
-            </a:r>
+              <a:t> Threading</a:t>
+            </a:r>
+          </a:p>
+          <a:p>
+            <a:endParaRPr lang="en-US" dirty="0" smtClean="0"/>
+          </a:p>
+          <a:p>
             <a:r>
               <a:rPr lang="en-US" dirty="0" smtClean="0"/>
-              <a:t> overview + Behaviorism presentation</a:t>
+              <a:t>&gt; Synchronization</a:t>
             </a:r>
           </a:p>
           <a:p>
@@ -3905,8 +3905,13 @@
             </a:r>
             <a:r>
               <a:rPr lang="en-US" dirty="0" smtClean="0"/>
-              <a:t> Talk about your final projects</a:t>
-            </a:r>
+              <a:t> Concurrent </a:t>
+            </a:r>
+            <a:r>
+              <a:rPr lang="en-US" dirty="0" smtClean="0"/>
+              <a:t>Data Structures</a:t>
+            </a:r>
+            <a:endParaRPr lang="en-US" dirty="0" smtClean="0"/>
           </a:p>
           <a:p>
             <a:endParaRPr lang="en-US" dirty="0" smtClean="0"/>
@@ -3965,7 +3970,7 @@
           <a:p>
             <a:r>
               <a:rPr lang="en-US" dirty="0" smtClean="0"/>
-              <a:t>Final Projects</a:t>
+              <a:t>Threads</a:t>
             </a:r>
             <a:endParaRPr lang="en-US" dirty="0"/>
           </a:p>
@@ -3989,159 +3994,56 @@
             <a:endParaRPr lang="en-US" dirty="0" smtClean="0"/>
           </a:p>
           <a:p>
+            <a:r>
+              <a:rPr lang="en-US" dirty="0" smtClean="0"/>
+              <a:t>Threads are needed whenever your program needs to do two things at the same time.</a:t>
+            </a:r>
+          </a:p>
+          <a:p>
             <a:endParaRPr lang="en-US" dirty="0" smtClean="0"/>
           </a:p>
           <a:p>
             <a:r>
               <a:rPr lang="en-US" dirty="0" smtClean="0"/>
-              <a:t>1. </a:t>
-            </a:r>
+              <a:t>Many frameworks already have some threading which may be hidden to the programmer:</a:t>
+            </a:r>
+          </a:p>
+          <a:p>
+            <a:endParaRPr lang="en-US" dirty="0" smtClean="0"/>
+          </a:p>
+          <a:p>
             <a:r>
               <a:rPr lang="en-US" dirty="0" smtClean="0"/>
-              <a:t>Algorithms</a:t>
-            </a:r>
+              <a:t>GUI frameworks have input listeners which run on different threads to determine if there is mouse input or keyboard input, as well as a drawing thread.</a:t>
+            </a:r>
+          </a:p>
+          <a:p>
+            <a:endParaRPr lang="en-US" dirty="0" smtClean="0"/>
+          </a:p>
+          <a:p>
             <a:r>
               <a:rPr lang="en-US" dirty="0" smtClean="0"/>
-              <a:t> Project &amp; Competition</a:t>
-            </a:r>
+              <a:t>OpenGL frameworks (GLUT, JOGL, etc) have a main animation thread which calls the display method as often as possible</a:t>
+            </a:r>
+          </a:p>
+          <a:p>
+            <a:endParaRPr lang="en-US" dirty="0" smtClean="0"/>
           </a:p>
           <a:p>
             <a:r>
               <a:rPr lang="en-US" dirty="0" smtClean="0"/>
-              <a:t>	- Build an interactive implementation of the the Set Daily Puzzle. </a:t>
-            </a:r>
-          </a:p>
-          <a:p>
-            <a:r>
-              <a:rPr lang="en-US" dirty="0" smtClean="0"/>
-              <a:t>			(</a:t>
-            </a:r>
-            <a:r>
-              <a:rPr lang="en-US" dirty="0" smtClean="0"/>
-              <a:t>http://</a:t>
-            </a:r>
-            <a:r>
-              <a:rPr lang="en-US" dirty="0" err="1" smtClean="0"/>
-              <a:t>www.setgame.com/set/</a:t>
-            </a:r>
-            <a:r>
-              <a:rPr lang="en-US" dirty="0" err="1" smtClean="0"/>
-              <a:t>puzzle_frame.htm</a:t>
-            </a:r>
-            <a:r>
-              <a:rPr lang="en-US" dirty="0" smtClean="0"/>
-              <a:t>) </a:t>
-            </a:r>
-          </a:p>
-          <a:p>
-            <a:r>
-              <a:rPr lang="en-US" dirty="0" smtClean="0"/>
-              <a:t>	- Create an algorithm to solve the puzzle in the shortest number of steps.</a:t>
-            </a:r>
-          </a:p>
-          <a:p>
-            <a:r>
-              <a:rPr lang="en-US" dirty="0" smtClean="0"/>
-              <a:t>	- On competition day, all implementations will be given the same game data. The</a:t>
-            </a:r>
-          </a:p>
-          <a:p>
-            <a:r>
-              <a:rPr lang="en-US" dirty="0" smtClean="0"/>
-              <a:t>			program that solves it in the least number of steps will be the winner.</a:t>
-            </a:r>
-          </a:p>
-          <a:p>
-            <a:r>
-              <a:rPr lang="en-US" dirty="0" smtClean="0"/>
-              <a:t>	- Grading will be as follows: 50% competition; 25% elegance/cleverness of algorithm &amp;</a:t>
-            </a:r>
-          </a:p>
-          <a:p>
-            <a:r>
-              <a:rPr lang="en-US" dirty="0" smtClean="0"/>
-              <a:t>			data structures; 25% visuals/interaction</a:t>
+              <a:t>Audio frameworks have a main audio thread which runs constantly to interact with the audio system</a:t>
             </a:r>
           </a:p>
           <a:p>
             <a:endParaRPr lang="en-US" dirty="0" smtClean="0"/>
           </a:p>
           <a:p>
-            <a:r>
-              <a:rPr lang="en-US" dirty="0" smtClean="0"/>
-              <a:t>2. Final Research Project &amp; Implementation</a:t>
-            </a:r>
-          </a:p>
-          <a:p>
-            <a:r>
-              <a:rPr lang="en-US" dirty="0" smtClean="0"/>
-              <a:t>	- Choose a project of your choice that utilizes media data in some shape or form 		(e.g. OpenGL, </a:t>
-            </a:r>
-            <a:r>
-              <a:rPr lang="en-US" dirty="0" err="1" smtClean="0"/>
-              <a:t>OpenCV</a:t>
-            </a:r>
-            <a:r>
-              <a:rPr lang="en-US" dirty="0" smtClean="0"/>
-              <a:t>, </a:t>
-            </a:r>
-            <a:r>
-              <a:rPr lang="en-US" dirty="0" err="1" smtClean="0"/>
-              <a:t>PortAudio</a:t>
-            </a:r>
-            <a:r>
-              <a:rPr lang="en-US" dirty="0" smtClean="0"/>
-              <a:t>, etc) using the language of your choice (C/C++,</a:t>
-            </a:r>
-          </a:p>
-          <a:p>
-            <a:r>
-              <a:rPr lang="en-US" dirty="0" smtClean="0"/>
-              <a:t>			Processing, Java, etc).   </a:t>
-            </a:r>
             <a:r>
               <a:rPr lang="en-US" dirty="0" smtClean="0"/>
               <a:t> </a:t>
             </a:r>
-          </a:p>
-          <a:p>
-            <a:r>
-              <a:rPr lang="en-US" dirty="0" smtClean="0"/>
-              <a:t>	- You will give two presentations: 1) a quick "flash forward" </a:t>
-            </a:r>
-            <a:r>
-              <a:rPr lang="en-US" dirty="0" smtClean="0"/>
-              <a:t>1</a:t>
-            </a:r>
-            <a:r>
-              <a:rPr lang="en-US" dirty="0" smtClean="0"/>
-              <a:t> minute overview of</a:t>
-            </a:r>
-          </a:p>
-          <a:p>
-            <a:r>
-              <a:rPr lang="en-US" dirty="0" smtClean="0"/>
-              <a:t>			 your project, describing the overall direction &amp; innovation of the project; and</a:t>
-            </a:r>
-          </a:p>
-          <a:p>
-            <a:r>
-              <a:rPr lang="en-US" dirty="0" smtClean="0"/>
-              <a:t>			 then 2) a final 15 minute presentation demonstrating the project.</a:t>
-            </a:r>
-          </a:p>
-          <a:p>
-            <a:r>
-              <a:rPr lang="en-US" dirty="0" smtClean="0"/>
-              <a:t>	- You will also need to create a website describing your final project.  </a:t>
-            </a:r>
-            <a:endParaRPr lang="en-US" dirty="0" smtClean="0"/>
-          </a:p>
-          <a:p>
-            <a:endParaRPr lang="en-US" dirty="0" smtClean="0"/>
-          </a:p>
-          <a:p>
-            <a:endParaRPr lang="en-US" dirty="0" smtClean="0"/>
+            <a:endParaRPr lang="en-US" dirty="0"/>
           </a:p>
         </p:txBody>
       </p:sp>
@@ -4150,13 +4052,6 @@
   <p:clrMapOvr>
     <a:masterClrMapping/>
   </p:clrMapOvr>
-  <p:timing>
-    <p:tnLst>
-      <p:par>
-        <p:cTn id="1" dur="indefinite" restart="never" nodeType="tmRoot"/>
-      </p:par>
-    </p:tnLst>
-  </p:timing>
 </p:sld>
 </file>
 
@@ -4194,7 +4089,7 @@
           <a:p>
             <a:r>
               <a:rPr lang="en-US" dirty="0" smtClean="0"/>
-              <a:t>Research Project &amp; Implementation</a:t>
+              <a:t>Threads</a:t>
             </a:r>
             <a:endParaRPr lang="en-US" dirty="0"/>
           </a:p>
@@ -4215,12 +4110,18 @@
           <a:bodyPr/>
           <a:lstStyle/>
           <a:p>
+            <a:r>
+              <a:rPr lang="en-US" dirty="0" smtClean="0"/>
+              <a:t>There are various reasons why you might want to spawn your own threads:</a:t>
+            </a:r>
+          </a:p>
+          <a:p>
             <a:endParaRPr lang="en-US" dirty="0" smtClean="0"/>
           </a:p>
           <a:p>
             <a:r>
               <a:rPr lang="en-US" dirty="0" smtClean="0"/>
-              <a:t>Research = Pushing the proverbial envelope...</a:t>
+              <a:t>1) in general, whenever you need to more than one thing simultaneously</a:t>
             </a:r>
           </a:p>
           <a:p>
@@ -4229,7 +4130,7 @@
           <a:p>
             <a:r>
               <a:rPr lang="en-US" dirty="0" smtClean="0"/>
-              <a:t>This should be exciting, novel, clever, inspiring on one or more levels...</a:t>
+              <a:t>For instance, to listen to UDP packets on a port and to draw something (as we saw with the Datagram project)</a:t>
             </a:r>
           </a:p>
           <a:p>
@@ -4238,13 +4139,16 @@
           <a:p>
             <a:r>
               <a:rPr lang="en-US" dirty="0" smtClean="0"/>
-              <a:t>1) Describe the envelope...</a:t>
-            </a:r>
+              <a:t>2) when a particular process will take a long time and slow down or pause your main thread</a:t>
+            </a:r>
+          </a:p>
+          <a:p>
+            <a:endParaRPr lang="en-US" dirty="0" smtClean="0"/>
           </a:p>
           <a:p>
             <a:r>
               <a:rPr lang="en-US" dirty="0" smtClean="0"/>
-              <a:t>		What is the overall context? What other work has been done in this area? Why is it important? How is different from other approaches?</a:t>
+              <a:t>For instance, an OpenGL game which executes code which evaluates the behavior of a NPC might take longer than the display rate and needs to be put in another thread else it will slow the rendering.</a:t>
             </a:r>
           </a:p>
           <a:p>
@@ -4253,32 +4157,19 @@
           <a:p>
             <a:r>
               <a:rPr lang="en-US" dirty="0" smtClean="0"/>
-              <a:t>2) Describe how you are pushing the envelope... </a:t>
-            </a:r>
-          </a:p>
-          <a:p>
-            <a:r>
-              <a:rPr lang="en-US" dirty="0" smtClean="0"/>
-              <a:t>		What is your concept/idea/innovation? What techniques did you utilize in order to  achieve/realize this (programming, algorithm, tools, etc)? What representation (artistic, mathematic, statistic, interactive) did you decide upon? What were the "design decisions" that influenced your project? </a:t>
-            </a:r>
-          </a:p>
-          <a:p>
-            <a:r>
-              <a:rPr lang="en-US" dirty="0" smtClean="0"/>
-              <a:t>	</a:t>
-            </a:r>
-          </a:p>
-          <a:p>
-            <a:r>
-              <a:rPr lang="en-US" dirty="0" smtClean="0"/>
-              <a:t>3) Evaluate the results of your pushing the envelope...</a:t>
-            </a:r>
-          </a:p>
-          <a:p>
-            <a:r>
-              <a:rPr lang="en-US" dirty="0" smtClean="0"/>
-              <a:t>		What happened? What do you think about it? What did people other people think? What were your methods to evaluate what they thought? What future work is there to do? </a:t>
-            </a:r>
+              <a:t>For instance, you might want to display a progress bar that shows how much of a file is being uploaded. One thread (the background thread) loads the file and the other thread checks the other thread to see how far along it is and displays that information accordingly</a:t>
+            </a:r>
+          </a:p>
+          <a:p>
+            <a:endParaRPr lang="en-US" dirty="0" smtClean="0"/>
+          </a:p>
+          <a:p>
+            <a:endParaRPr lang="en-US" dirty="0" smtClean="0"/>
+          </a:p>
+          <a:p>
+            <a:endParaRPr lang="en-US" dirty="0" smtClean="0"/>
+          </a:p>
+          <a:p>
             <a:endParaRPr lang="en-US" dirty="0"/>
           </a:p>
         </p:txBody>
@@ -4325,7 +4216,7 @@
           <a:p>
             <a:r>
               <a:rPr lang="en-US" dirty="0" smtClean="0"/>
-              <a:t>What does a program do?</a:t>
+              <a:t>Threads</a:t>
             </a:r>
             <a:endParaRPr lang="en-US" dirty="0"/>
           </a:p>
@@ -4349,15 +4240,27 @@
             <a:endParaRPr lang="en-US" dirty="0" smtClean="0"/>
           </a:p>
           <a:p>
+            <a:r>
+              <a:rPr lang="en-US" dirty="0" smtClean="0"/>
+              <a:t>The main difficulty that arises when dealing with threads is when you have more than one thread which needs to manipulate the same data.</a:t>
+            </a:r>
+          </a:p>
+          <a:p>
             <a:endParaRPr lang="en-US" dirty="0" smtClean="0"/>
           </a:p>
           <a:p>
+            <a:r>
+              <a:rPr lang="en-US" dirty="0" smtClean="0"/>
+              <a:t>For instance, as a simple example, a program which draws shapes to the screen</a:t>
+            </a:r>
+          </a:p>
+          <a:p>
             <a:endParaRPr lang="en-US" dirty="0" smtClean="0"/>
           </a:p>
           <a:p>
             <a:r>
               <a:rPr lang="en-US" dirty="0" smtClean="0"/>
-              <a:t>1. Takes in data			</a:t>
+              <a:t>Thread 1 : waits for user input via a GUI to decide what shapes to draw to the screen</a:t>
             </a:r>
           </a:p>
           <a:p>
@@ -4366,25 +4269,25 @@
           <a:p>
             <a:r>
               <a:rPr lang="en-US" dirty="0" smtClean="0"/>
-              <a:t>				</a:t>
-            </a:r>
-            <a:r>
-              <a:rPr lang="en-US" dirty="0" err="1" smtClean="0">
-                <a:latin typeface="Wingdings"/>
-                <a:ea typeface="Wingdings"/>
-                <a:cs typeface="Wingdings"/>
-              </a:rPr>
-              <a:t></a:t>
-            </a:r>
+              <a:t>Thread 2 : draws those shapes to the screen</a:t>
+            </a:r>
+          </a:p>
+          <a:p>
             <a:endParaRPr lang="en-US" dirty="0" smtClean="0"/>
           </a:p>
           <a:p>
+            <a:r>
+              <a:rPr lang="en-US" dirty="0" smtClean="0"/>
+              <a:t>The main data structure in this case might be a List of Shapes.</a:t>
+            </a:r>
+          </a:p>
+          <a:p>
             <a:endParaRPr lang="en-US" dirty="0" smtClean="0"/>
           </a:p>
           <a:p>
             <a:r>
               <a:rPr lang="en-US" dirty="0" smtClean="0"/>
-              <a:t>2. Manipulates the data 	</a:t>
+              <a:t>If Thread 2, which is drawing the shapes, accesses the List at the same time that Thread 1, which is updating the shapes, adds or deletes shapes, this can cause instability in your program.</a:t>
             </a:r>
           </a:p>
           <a:p>
@@ -4393,34 +4296,8 @@
           <a:p>
             <a:r>
               <a:rPr lang="en-US" dirty="0" smtClean="0"/>
-              <a:t>				</a:t>
-            </a:r>
-            <a:r>
-              <a:rPr lang="en-US" dirty="0" err="1" smtClean="0">
-                <a:latin typeface="Wingdings"/>
-                <a:ea typeface="Wingdings"/>
-                <a:cs typeface="Wingdings"/>
-              </a:rPr>
-              <a:t></a:t>
-            </a:r>
-            <a:endParaRPr lang="en-US" dirty="0" smtClean="0"/>
-          </a:p>
-          <a:p>
-            <a:endParaRPr lang="en-US" dirty="0" smtClean="0"/>
-          </a:p>
-          <a:p>
-            <a:r>
-              <a:rPr lang="en-US" dirty="0" smtClean="0"/>
-              <a:t>3. Sends data out</a:t>
-            </a:r>
-          </a:p>
-          <a:p>
-            <a:endParaRPr lang="en-US" dirty="0" smtClean="0"/>
-          </a:p>
-          <a:p>
-            <a:endParaRPr lang="en-US" dirty="0" smtClean="0"/>
-          </a:p>
-          <a:p>
+              <a:t>In Java, where data structures are "fail fast", your program will exit with a runtime "Concurrent Modification Exception"  </a:t>
+            </a:r>
             <a:endParaRPr lang="en-US" dirty="0"/>
           </a:p>
         </p:txBody>
@@ -4430,13 +4307,6 @@
   <p:clrMapOvr>
     <a:masterClrMapping/>
   </p:clrMapOvr>
-  <p:timing>
-    <p:tnLst>
-      <p:par>
-        <p:cTn id="1" dur="indefinite" restart="never" nodeType="tmRoot"/>
-      </p:par>
-    </p:tnLst>
-  </p:timing>
 </p:sld>
 </file>
 
@@ -4474,7 +4344,7 @@
           <a:p>
             <a:r>
               <a:rPr lang="en-US" dirty="0" smtClean="0"/>
-              <a:t>Types of inputs</a:t>
+              <a:t>Synchronization</a:t>
             </a:r>
             <a:endParaRPr lang="en-US" dirty="0"/>
           </a:p>
@@ -4495,12 +4365,32 @@
           <a:bodyPr/>
           <a:lstStyle/>
           <a:p>
+            <a:r>
+              <a:rPr lang="en-US" dirty="0" smtClean="0"/>
+              <a:t>There are a few different strategies to deal with this situation:</a:t>
+            </a:r>
+          </a:p>
+          <a:p>
             <a:endParaRPr lang="en-US" dirty="0" smtClean="0"/>
           </a:p>
           <a:p>
             <a:r>
               <a:rPr lang="en-US" dirty="0" smtClean="0"/>
-              <a:t>User interaction: mouse, keyboard</a:t>
+              <a:t>1) have one thread make a complete copy of the </a:t>
+            </a:r>
+            <a:r>
+              <a:rPr lang="en-US" dirty="0" smtClean="0"/>
+              <a:t>d</a:t>
+            </a:r>
+            <a:r>
+              <a:rPr lang="en-US" dirty="0" smtClean="0"/>
+              <a:t>ata structure before it starts to use it</a:t>
+            </a:r>
+          </a:p>
+          <a:p>
+            <a:r>
+              <a:rPr lang="en-US" dirty="0" smtClean="0"/>
+              <a:t>		For instance, the drawing thread could copy the data at the start of the display loop so that updates on the other thread do not effect it</a:t>
             </a:r>
           </a:p>
           <a:p>
@@ -4509,7 +4399,7 @@
           <a:p>
             <a:r>
               <a:rPr lang="en-US" dirty="0" smtClean="0"/>
-              <a:t>Multimedia: video camera, microphone, sensors</a:t>
+              <a:t>If you have a lot of data this could be slow and memory intensive, and might trigger lots of garbage collection, etc.</a:t>
             </a:r>
           </a:p>
           <a:p>
@@ -4518,7 +4408,15 @@
           <a:p>
             <a:r>
               <a:rPr lang="en-US" dirty="0" smtClean="0"/>
-              <a:t>Control messages: instructions from another program</a:t>
+              <a:t>2) create a "lock" of some kind (a </a:t>
+            </a:r>
+            <a:r>
+              <a:rPr lang="en-US" dirty="0" err="1" smtClean="0"/>
+              <a:t>mutex</a:t>
+            </a:r>
+            <a:r>
+              <a:rPr lang="en-US" dirty="0" smtClean="0"/>
+              <a:t>, a semaphore, etc) which checks a flag to see if it safe to access the data structure. These can be tricky to write sometimes, but there are built in methods in Java 6 and above</a:t>
             </a:r>
           </a:p>
           <a:p>
@@ -4527,48 +4425,44 @@
           <a:p>
             <a:r>
               <a:rPr lang="en-US" dirty="0" smtClean="0"/>
-              <a:t>Network data: IP packets, UDP </a:t>
-            </a:r>
-            <a:r>
-              <a:rPr lang="en-US" dirty="0" err="1" smtClean="0"/>
-              <a:t>datagrams</a:t>
-            </a:r>
+              <a:t>3</a:t>
+            </a:r>
+            <a:r>
+              <a:rPr lang="en-US" dirty="0" smtClean="0"/>
+              <a:t>) create synchronized methods to access your data structure. Synchronized methods automatically lock so that only one thread can access the method at a time. This will protect your data structure from being manipulated by multiple threads concurrently.</a:t>
+            </a:r>
+          </a:p>
+          <a:p>
+            <a:r>
+              <a:rPr lang="en-US" dirty="0" smtClean="0"/>
+              <a:t>		This usually works well, but could potentially slow down performance if you often have lots of updates to your data structure</a:t>
+            </a:r>
+          </a:p>
+          <a:p>
             <a:endParaRPr lang="en-US" dirty="0" smtClean="0"/>
           </a:p>
           <a:p>
+            <a:r>
+              <a:rPr lang="en-US" dirty="0" smtClean="0"/>
+              <a:t>4</a:t>
+            </a:r>
+            <a:r>
+              <a:rPr lang="en-US" dirty="0" smtClean="0"/>
+              <a:t>) use a synchronized data structure and lock the data structure using the "synchronize" keyword before reading from or updating the data</a:t>
+            </a:r>
+          </a:p>
+          <a:p>
             <a:endParaRPr lang="en-US" dirty="0" smtClean="0"/>
           </a:p>
           <a:p>
             <a:r>
               <a:rPr lang="en-US" dirty="0" smtClean="0"/>
-              <a:t>Stored data: information stored in databases, files, spreadsheets</a:t>
-            </a:r>
-          </a:p>
-          <a:p>
-            <a:endParaRPr lang="en-US" dirty="0" smtClean="0"/>
-          </a:p>
-          <a:p>
+              <a:t>5</a:t>
+            </a:r>
             <a:r>
               <a:rPr lang="en-US" dirty="0" smtClean="0"/>
-              <a:t>Real-time data: RSS feeds, market data</a:t>
-            </a:r>
-          </a:p>
-          <a:p>
-            <a:endParaRPr lang="en-US" dirty="0"/>
-          </a:p>
-          <a:p>
-            <a:endParaRPr lang="en-US" dirty="0" smtClean="0"/>
-          </a:p>
-          <a:p>
-            <a:r>
-              <a:rPr lang="en-US" dirty="0" smtClean="0"/>
-              <a:t> </a:t>
-            </a:r>
-          </a:p>
-          <a:p>
-            <a:endParaRPr lang="en-US" dirty="0" smtClean="0"/>
-          </a:p>
-          <a:p>
+              <a:t>) use a concurrent data structure which automatically synchronizes the data structure  </a:t>
+            </a:r>
             <a:endParaRPr lang="en-US" dirty="0"/>
           </a:p>
         </p:txBody>
@@ -4578,231 +4472,6 @@
   <p:clrMapOvr>
     <a:masterClrMapping/>
   </p:clrMapOvr>
-  <p:timing>
-    <p:tnLst>
-      <p:par>
-        <p:cTn id="1" dur="indefinite" restart="never" nodeType="tmRoot"/>
-      </p:par>
-    </p:tnLst>
-  </p:timing>
-</p:sld>
-</file>
-
-<file path=ppt/slides/slide6.xml><?xml version="1.0" encoding="utf-8"?>
-<p:sld xmlns:a="http://schemas.openxmlformats.org/drawingml/2006/main" xmlns:r="http://schemas.openxmlformats.org/officeDocument/2006/relationships" xmlns:mc="http://schemas.openxmlformats.org/markup-compatibility/2006" xmlns:mv="urn:schemas-microsoft-com:mac:vml" xmlns:p="http://schemas.openxmlformats.org/presentationml/2006/main" mc:Ignorable="mv" mc:PreserveAttributes="mv:*">
-  <p:cSld>
-    <p:spTree>
-      <p:nvGrpSpPr>
-        <p:cNvPr id="1" name=""/>
-        <p:cNvGrpSpPr/>
-        <p:nvPr/>
-      </p:nvGrpSpPr>
-      <p:grpSpPr>
-        <a:xfrm>
-          <a:off x="0" y="0"/>
-          <a:ext cx="0" cy="0"/>
-          <a:chOff x="0" y="0"/>
-          <a:chExt cx="0" cy="0"/>
-        </a:xfrm>
-      </p:grpSpPr>
-      <p:sp>
-        <p:nvSpPr>
-          <p:cNvPr id="2" name="Title 1"/>
-          <p:cNvSpPr>
-            <a:spLocks noGrp="1"/>
-          </p:cNvSpPr>
-          <p:nvPr>
-            <p:ph type="title"/>
-          </p:nvPr>
-        </p:nvSpPr>
-        <p:spPr/>
-        <p:txBody>
-          <a:bodyPr/>
-          <a:lstStyle/>
-          <a:p>
-            <a:r>
-              <a:rPr lang="en-US" dirty="0" smtClean="0"/>
-              <a:t>Types of manipulation</a:t>
-            </a:r>
-            <a:endParaRPr lang="en-US" dirty="0"/>
-          </a:p>
-        </p:txBody>
-      </p:sp>
-      <p:sp>
-        <p:nvSpPr>
-          <p:cNvPr id="3" name="Content Placeholder 2"/>
-          <p:cNvSpPr>
-            <a:spLocks noGrp="1"/>
-          </p:cNvSpPr>
-          <p:nvPr>
-            <p:ph idx="1"/>
-          </p:nvPr>
-        </p:nvSpPr>
-        <p:spPr/>
-        <p:txBody>
-          <a:bodyPr/>
-          <a:lstStyle/>
-          <a:p>
-            <a:endParaRPr lang="en-US" dirty="0" smtClean="0"/>
-          </a:p>
-          <a:p>
-            <a:r>
-              <a:rPr lang="en-US" dirty="0"/>
-              <a:t>F</a:t>
-            </a:r>
-            <a:r>
-              <a:rPr lang="en-US" dirty="0" smtClean="0"/>
-              <a:t>iltering data - removing unimportant stuff</a:t>
-            </a:r>
-          </a:p>
-          <a:p>
-            <a:endParaRPr lang="en-US" dirty="0" smtClean="0"/>
-          </a:p>
-          <a:p>
-            <a:r>
-              <a:rPr lang="en-US" dirty="0"/>
-              <a:t>R</a:t>
-            </a:r>
-            <a:r>
-              <a:rPr lang="en-US" dirty="0" smtClean="0"/>
-              <a:t>earranging data - sorting data into more and less important stuff</a:t>
-            </a:r>
-          </a:p>
-          <a:p>
-            <a:endParaRPr lang="en-US" dirty="0" smtClean="0"/>
-          </a:p>
-          <a:p>
-            <a:r>
-              <a:rPr lang="en-US" dirty="0"/>
-              <a:t>S</a:t>
-            </a:r>
-            <a:r>
-              <a:rPr lang="en-US" dirty="0" smtClean="0"/>
-              <a:t>egmenting data - placing data into various categories</a:t>
-            </a:r>
-          </a:p>
-          <a:p>
-            <a:endParaRPr lang="en-US" dirty="0" smtClean="0"/>
-          </a:p>
-          <a:p>
-            <a:r>
-              <a:rPr lang="en-US" dirty="0"/>
-              <a:t>T</a:t>
-            </a:r>
-            <a:r>
-              <a:rPr lang="en-US" dirty="0" smtClean="0"/>
-              <a:t>ransforming data - applying rules to input data to turn it to new data</a:t>
-            </a:r>
-          </a:p>
-          <a:p>
-            <a:endParaRPr lang="en-US" dirty="0" smtClean="0"/>
-          </a:p>
-          <a:p>
-            <a:endParaRPr lang="en-US" dirty="0" smtClean="0"/>
-          </a:p>
-          <a:p>
-            <a:r>
-              <a:rPr lang="en-US" dirty="0" smtClean="0"/>
-              <a:t>In very general computer science terms:</a:t>
-            </a:r>
-          </a:p>
-          <a:p>
-            <a:endParaRPr lang="en-US" dirty="0" smtClean="0"/>
-          </a:p>
-          <a:p>
-            <a:r>
-              <a:rPr lang="en-US" dirty="0" smtClean="0"/>
-              <a:t>first, you place the input data into appropriate data structures...</a:t>
-            </a:r>
-          </a:p>
-          <a:p>
-            <a:r>
-              <a:rPr lang="en-US" dirty="0" smtClean="0"/>
-              <a:t>...and then manipulate the data using appropriate algorithms</a:t>
-            </a:r>
-          </a:p>
-          <a:p>
-            <a:endParaRPr lang="en-US" dirty="0" smtClean="0"/>
-          </a:p>
-          <a:p>
-            <a:endParaRPr lang="en-US" dirty="0" smtClean="0"/>
-          </a:p>
-          <a:p>
-            <a:r>
-              <a:rPr lang="en-US" i="1" dirty="0" smtClean="0"/>
-              <a:t>data structure : noun :: algorithm : verb</a:t>
-            </a:r>
-          </a:p>
-          <a:p>
-            <a:endParaRPr lang="en-US" dirty="0" smtClean="0"/>
-          </a:p>
-          <a:p>
-            <a:r>
-              <a:rPr lang="en-US" dirty="0" smtClean="0"/>
-              <a:t>"my program uses the </a:t>
-            </a:r>
-            <a:r>
-              <a:rPr lang="en-US" dirty="0" err="1" smtClean="0"/>
-              <a:t>quicksort</a:t>
-            </a:r>
-            <a:r>
-              <a:rPr lang="en-US" dirty="0" smtClean="0"/>
-              <a:t> algorithm to rearrange the linked list"</a:t>
-            </a:r>
-          </a:p>
-          <a:p>
-            <a:r>
-              <a:rPr lang="en-US" dirty="0" smtClean="0"/>
-              <a:t>"my program uses a low pass filter to attenuate high-frequencies in my ring buffer"</a:t>
-            </a:r>
-          </a:p>
-          <a:p>
-            <a:endParaRPr lang="en-US" dirty="0" smtClean="0"/>
-          </a:p>
-          <a:p>
-            <a:endParaRPr lang="en-US" dirty="0" smtClean="0"/>
-          </a:p>
-          <a:p>
-            <a:endParaRPr lang="en-US" dirty="0"/>
-          </a:p>
-          <a:p>
-            <a:endParaRPr lang="en-US" dirty="0" smtClean="0"/>
-          </a:p>
-          <a:p>
-            <a:endParaRPr lang="en-US" dirty="0"/>
-          </a:p>
-          <a:p>
-            <a:endParaRPr lang="en-US" dirty="0" smtClean="0"/>
-          </a:p>
-          <a:p>
-            <a:endParaRPr lang="en-US" dirty="0" smtClean="0"/>
-          </a:p>
-          <a:p>
-            <a:endParaRPr lang="en-US" dirty="0" smtClean="0"/>
-          </a:p>
-          <a:p>
-            <a:endParaRPr lang="en-US" dirty="0" smtClean="0"/>
-          </a:p>
-          <a:p>
-            <a:endParaRPr lang="en-US" dirty="0" smtClean="0"/>
-          </a:p>
-          <a:p>
-            <a:endParaRPr lang="en-US" dirty="0"/>
-          </a:p>
-        </p:txBody>
-      </p:sp>
-    </p:spTree>
-  </p:cSld>
-  <p:clrMapOvr>
-    <a:masterClrMapping/>
-  </p:clrMapOvr>
-  <p:timing>
-    <p:tnLst>
-      <p:par>
-        <p:cTn id="1" dur="indefinite" restart="never" nodeType="tmRoot"/>
-      </p:par>
-    </p:tnLst>
-  </p:timing>
 </p:sld>
 </file>
 

</xml_diff>